<commit_message>
ya quedó introducción, falta imágenes
</commit_message>
<xml_diff>
--- a/Presentación.pptx
+++ b/Presentación.pptx
@@ -10,9 +10,9 @@
     <p:sldId id="258" r:id="rId4"/>
     <p:sldId id="260" r:id="rId5"/>
     <p:sldId id="265" r:id="rId6"/>
-    <p:sldId id="267" r:id="rId7"/>
-    <p:sldId id="268" r:id="rId8"/>
-    <p:sldId id="269" r:id="rId9"/>
+    <p:sldId id="269" r:id="rId7"/>
+    <p:sldId id="267" r:id="rId8"/>
+    <p:sldId id="268" r:id="rId9"/>
     <p:sldId id="259" r:id="rId10"/>
     <p:sldId id="270" r:id="rId11"/>
     <p:sldId id="261" r:id="rId12"/>
@@ -3614,7 +3614,7 @@
           <a:p>
             <a:r>
               <a:rPr lang="en-US" dirty="0" err="1"/>
-              <a:t>Código</a:t>
+              <a:t>Implementación</a:t>
             </a:r>
             <a:endParaRPr lang="es-CO" dirty="0"/>
           </a:p>
@@ -3634,7 +3634,7 @@
         </p:nvSpPr>
         <p:spPr>
           <a:xfrm>
-            <a:off x="4750459" y="1955750"/>
+            <a:off x="4519851" y="2000308"/>
             <a:ext cx="3121817" cy="461665"/>
           </a:xfrm>
           <a:prstGeom prst="rect">
@@ -4084,66 +4084,6 @@
           </a:p>
         </p:txBody>
       </p:sp>
-      <p:sp>
-        <p:nvSpPr>
-          <p:cNvPr id="3" name="Content Placeholder 2"/>
-          <p:cNvSpPr>
-            <a:spLocks noGrp="1"/>
-          </p:cNvSpPr>
-          <p:nvPr>
-            <p:ph idx="1"/>
-          </p:nvPr>
-        </p:nvSpPr>
-        <p:spPr>
-          <a:xfrm>
-            <a:off x="1143000" y="2047009"/>
-            <a:ext cx="9872871" cy="4038600"/>
-          </a:xfrm>
-        </p:spPr>
-        <p:txBody>
-          <a:bodyPr/>
-          <a:lstStyle/>
-          <a:p>
-            <a:r>
-              <a:rPr lang="en-US" dirty="0" err="1">
-                <a:solidFill>
-                  <a:schemeClr val="tx1"/>
-                </a:solidFill>
-                <a:latin typeface="Calibri Light" panose="020F0302020204030204" pitchFamily="34" charset="0"/>
-                <a:cs typeface="Calibri Light" panose="020F0302020204030204" pitchFamily="34" charset="0"/>
-              </a:rPr>
-              <a:t>Muestra</a:t>
-            </a:r>
-            <a:r>
-              <a:rPr lang="en-US" dirty="0">
-                <a:solidFill>
-                  <a:schemeClr val="tx1"/>
-                </a:solidFill>
-                <a:latin typeface="Calibri Light" panose="020F0302020204030204" pitchFamily="34" charset="0"/>
-                <a:cs typeface="Calibri Light" panose="020F0302020204030204" pitchFamily="34" charset="0"/>
-              </a:rPr>
-              <a:t> de que </a:t>
-            </a:r>
-            <a:r>
-              <a:rPr lang="en-US" dirty="0" err="1">
-                <a:solidFill>
-                  <a:schemeClr val="tx1"/>
-                </a:solidFill>
-                <a:latin typeface="Calibri Light" panose="020F0302020204030204" pitchFamily="34" charset="0"/>
-                <a:cs typeface="Calibri Light" panose="020F0302020204030204" pitchFamily="34" charset="0"/>
-              </a:rPr>
-              <a:t>funciona</a:t>
-            </a:r>
-            <a:endParaRPr lang="es-CO" dirty="0">
-              <a:solidFill>
-                <a:schemeClr val="tx1"/>
-              </a:solidFill>
-              <a:latin typeface="Calibri Light" panose="020F0302020204030204" pitchFamily="34" charset="0"/>
-              <a:cs typeface="Calibri Light" panose="020F0302020204030204" pitchFamily="34" charset="0"/>
-            </a:endParaRPr>
-          </a:p>
-        </p:txBody>
-      </p:sp>
     </p:spTree>
     <p:extLst>
       <p:ext uri="{BB962C8B-B14F-4D97-AF65-F5344CB8AC3E}">
@@ -4194,166 +4134,6 @@
               <a:t>Resultados</a:t>
             </a:r>
             <a:endParaRPr lang="es-CO" dirty="0"/>
-          </a:p>
-        </p:txBody>
-      </p:sp>
-      <p:sp>
-        <p:nvSpPr>
-          <p:cNvPr id="3" name="Content Placeholder 2"/>
-          <p:cNvSpPr>
-            <a:spLocks noGrp="1"/>
-          </p:cNvSpPr>
-          <p:nvPr>
-            <p:ph idx="1"/>
-          </p:nvPr>
-        </p:nvSpPr>
-        <p:spPr>
-          <a:xfrm>
-            <a:off x="1143000" y="2047009"/>
-            <a:ext cx="9872871" cy="4038600"/>
-          </a:xfrm>
-        </p:spPr>
-        <p:txBody>
-          <a:bodyPr/>
-          <a:lstStyle/>
-          <a:p>
-            <a:r>
-              <a:rPr lang="en-US" dirty="0" err="1">
-                <a:solidFill>
-                  <a:schemeClr val="tx1"/>
-                </a:solidFill>
-                <a:latin typeface="Calibri Light" panose="020F0302020204030204" pitchFamily="34" charset="0"/>
-                <a:cs typeface="Calibri Light" panose="020F0302020204030204" pitchFamily="34" charset="0"/>
-              </a:rPr>
-              <a:t>Por</a:t>
-            </a:r>
-            <a:r>
-              <a:rPr lang="en-US" dirty="0">
-                <a:solidFill>
-                  <a:schemeClr val="tx1"/>
-                </a:solidFill>
-                <a:latin typeface="Calibri Light" panose="020F0302020204030204" pitchFamily="34" charset="0"/>
-                <a:cs typeface="Calibri Light" panose="020F0302020204030204" pitchFamily="34" charset="0"/>
-              </a:rPr>
-              <a:t> </a:t>
-            </a:r>
-            <a:r>
-              <a:rPr lang="en-US" dirty="0" err="1">
-                <a:solidFill>
-                  <a:schemeClr val="tx1"/>
-                </a:solidFill>
-                <a:latin typeface="Calibri Light" panose="020F0302020204030204" pitchFamily="34" charset="0"/>
-                <a:cs typeface="Calibri Light" panose="020F0302020204030204" pitchFamily="34" charset="0"/>
-              </a:rPr>
-              <a:t>ejemplo</a:t>
-            </a:r>
-            <a:r>
-              <a:rPr lang="en-US" dirty="0">
-                <a:solidFill>
-                  <a:schemeClr val="tx1"/>
-                </a:solidFill>
-                <a:latin typeface="Calibri Light" panose="020F0302020204030204" pitchFamily="34" charset="0"/>
-                <a:cs typeface="Calibri Light" panose="020F0302020204030204" pitchFamily="34" charset="0"/>
-              </a:rPr>
-              <a:t> </a:t>
-            </a:r>
-            <a:r>
-              <a:rPr lang="en-US" dirty="0" err="1">
-                <a:solidFill>
-                  <a:schemeClr val="tx1"/>
-                </a:solidFill>
-                <a:latin typeface="Calibri Light" panose="020F0302020204030204" pitchFamily="34" charset="0"/>
-                <a:cs typeface="Calibri Light" panose="020F0302020204030204" pitchFamily="34" charset="0"/>
-              </a:rPr>
-              <a:t>variar</a:t>
-            </a:r>
-            <a:r>
-              <a:rPr lang="en-US" dirty="0">
-                <a:solidFill>
-                  <a:schemeClr val="tx1"/>
-                </a:solidFill>
-                <a:latin typeface="Calibri Light" panose="020F0302020204030204" pitchFamily="34" charset="0"/>
-                <a:cs typeface="Calibri Light" panose="020F0302020204030204" pitchFamily="34" charset="0"/>
-              </a:rPr>
-              <a:t> </a:t>
-            </a:r>
-            <a:r>
-              <a:rPr lang="en-US" dirty="0" err="1">
-                <a:solidFill>
-                  <a:schemeClr val="tx1"/>
-                </a:solidFill>
-                <a:latin typeface="Calibri Light" panose="020F0302020204030204" pitchFamily="34" charset="0"/>
-                <a:cs typeface="Calibri Light" panose="020F0302020204030204" pitchFamily="34" charset="0"/>
-              </a:rPr>
-              <a:t>taus</a:t>
-            </a:r>
-            <a:r>
-              <a:rPr lang="en-US" dirty="0">
-                <a:solidFill>
-                  <a:schemeClr val="tx1"/>
-                </a:solidFill>
-                <a:latin typeface="Calibri Light" panose="020F0302020204030204" pitchFamily="34" charset="0"/>
-                <a:cs typeface="Calibri Light" panose="020F0302020204030204" pitchFamily="34" charset="0"/>
-              </a:rPr>
-              <a:t> o </a:t>
-            </a:r>
-            <a:r>
-              <a:rPr lang="en-US" dirty="0" err="1">
-                <a:solidFill>
-                  <a:schemeClr val="tx1"/>
-                </a:solidFill>
-                <a:latin typeface="Calibri Light" panose="020F0302020204030204" pitchFamily="34" charset="0"/>
-                <a:cs typeface="Calibri Light" panose="020F0302020204030204" pitchFamily="34" charset="0"/>
-              </a:rPr>
-              <a:t>velocidad</a:t>
-            </a:r>
-            <a:r>
-              <a:rPr lang="en-US" dirty="0">
-                <a:solidFill>
-                  <a:schemeClr val="tx1"/>
-                </a:solidFill>
-                <a:latin typeface="Calibri Light" panose="020F0302020204030204" pitchFamily="34" charset="0"/>
-                <a:cs typeface="Calibri Light" panose="020F0302020204030204" pitchFamily="34" charset="0"/>
-              </a:rPr>
-              <a:t> de entrada o rho – </a:t>
-            </a:r>
-            <a:r>
-              <a:rPr lang="en-US" dirty="0" err="1">
-                <a:solidFill>
-                  <a:schemeClr val="tx1"/>
-                </a:solidFill>
-                <a:latin typeface="Calibri Light" panose="020F0302020204030204" pitchFamily="34" charset="0"/>
-                <a:cs typeface="Calibri Light" panose="020F0302020204030204" pitchFamily="34" charset="0"/>
-              </a:rPr>
-              <a:t>gráfica</a:t>
-            </a:r>
-            <a:r>
-              <a:rPr lang="en-US" dirty="0">
-                <a:solidFill>
-                  <a:schemeClr val="tx1"/>
-                </a:solidFill>
-                <a:latin typeface="Calibri Light" panose="020F0302020204030204" pitchFamily="34" charset="0"/>
-                <a:cs typeface="Calibri Light" panose="020F0302020204030204" pitchFamily="34" charset="0"/>
-              </a:rPr>
-              <a:t> de </a:t>
-            </a:r>
-            <a:r>
-              <a:rPr lang="en-US" dirty="0" err="1">
-                <a:solidFill>
-                  <a:schemeClr val="tx1"/>
-                </a:solidFill>
-                <a:latin typeface="Calibri Light" panose="020F0302020204030204" pitchFamily="34" charset="0"/>
-                <a:cs typeface="Calibri Light" panose="020F0302020204030204" pitchFamily="34" charset="0"/>
-              </a:rPr>
-              <a:t>tendencia</a:t>
-            </a:r>
-            <a:endParaRPr lang="es-CO" dirty="0">
-              <a:solidFill>
-                <a:schemeClr val="tx1"/>
-              </a:solidFill>
-              <a:latin typeface="Calibri Light" panose="020F0302020204030204" pitchFamily="34" charset="0"/>
-              <a:cs typeface="Calibri Light" panose="020F0302020204030204" pitchFamily="34" charset="0"/>
-            </a:endParaRPr>
           </a:p>
         </p:txBody>
       </p:sp>
@@ -4720,26 +4500,48 @@
         </p:nvSpPr>
         <p:spPr>
           <a:xfrm>
-            <a:off x="1143000" y="2036618"/>
-            <a:ext cx="9872871" cy="4038600"/>
+            <a:off x="8110814" y="2548616"/>
+            <a:ext cx="3403853" cy="2696792"/>
           </a:xfrm>
         </p:spPr>
         <p:txBody>
-          <a:bodyPr/>
+          <a:bodyPr>
+            <a:normAutofit fontScale="92500" lnSpcReduction="10000"/>
+          </a:bodyPr>
           <a:lstStyle/>
           <a:p>
             <a:r>
-              <a:rPr lang="en-US" dirty="0" err="1">
+              <a:rPr lang="en-US" sz="2000" dirty="0">
                 <a:solidFill>
                   <a:schemeClr val="tx1"/>
                 </a:solidFill>
                 <a:latin typeface="Calibri Light" panose="020F0302020204030204" pitchFamily="34" charset="0"/>
                 <a:cs typeface="Calibri Light" panose="020F0302020204030204" pitchFamily="34" charset="0"/>
               </a:rPr>
-              <a:t>plantear</a:t>
-            </a:r>
-            <a:r>
-              <a:rPr lang="en-US" dirty="0">
+              <a:t>Se simul</a:t>
+            </a:r>
+            <a:r>
+              <a:rPr lang="es-CO" sz="2000" dirty="0">
+                <a:solidFill>
+                  <a:schemeClr val="tx1"/>
+                </a:solidFill>
+                <a:latin typeface="Calibri Light" panose="020F0302020204030204" pitchFamily="34" charset="0"/>
+                <a:cs typeface="Calibri Light" panose="020F0302020204030204" pitchFamily="34" charset="0"/>
+              </a:rPr>
+              <a:t>ó las fuerzas de sustentación que experimenta un perfil de ala de un avión durante su vuelo debido a su interacción con el aire, utilizando </a:t>
+            </a:r>
+            <a:r>
+              <a:rPr lang="es-CO" sz="2000" dirty="0" err="1">
+                <a:solidFill>
+                  <a:schemeClr val="tx1"/>
+                </a:solidFill>
+                <a:latin typeface="Calibri Light" panose="020F0302020204030204" pitchFamily="34" charset="0"/>
+                <a:cs typeface="Calibri Light" panose="020F0302020204030204" pitchFamily="34" charset="0"/>
+              </a:rPr>
+              <a:t>Lattice</a:t>
+            </a:r>
+            <a:r>
+              <a:rPr lang="es-CO" sz="2000" dirty="0">
                 <a:solidFill>
                   <a:schemeClr val="tx1"/>
                 </a:solidFill>
@@ -4749,65 +4551,87 @@
               <a:t> </a:t>
             </a:r>
             <a:r>
-              <a:rPr lang="en-US" dirty="0" err="1">
+              <a:rPr lang="es-CO" sz="2000" dirty="0" err="1">
                 <a:solidFill>
                   <a:schemeClr val="tx1"/>
                 </a:solidFill>
                 <a:latin typeface="Calibri Light" panose="020F0302020204030204" pitchFamily="34" charset="0"/>
                 <a:cs typeface="Calibri Light" panose="020F0302020204030204" pitchFamily="34" charset="0"/>
               </a:rPr>
-              <a:t>fenómeno</a:t>
-            </a:r>
-            <a:r>
-              <a:rPr lang="en-US" dirty="0">
+              <a:t>Boltzmann</a:t>
+            </a:r>
+            <a:r>
+              <a:rPr lang="es-CO" sz="2000" dirty="0">
                 <a:solidFill>
                   <a:schemeClr val="tx1"/>
                 </a:solidFill>
                 <a:latin typeface="Calibri Light" panose="020F0302020204030204" pitchFamily="34" charset="0"/>
                 <a:cs typeface="Calibri Light" panose="020F0302020204030204" pitchFamily="34" charset="0"/>
               </a:rPr>
-              <a:t> que se </a:t>
-            </a:r>
-            <a:r>
-              <a:rPr lang="en-US" dirty="0" err="1">
+              <a:t> </a:t>
+            </a:r>
+          </a:p>
+          <a:p>
+            <a:r>
+              <a:rPr lang="es-CO" sz="2000" dirty="0">
                 <a:solidFill>
                   <a:schemeClr val="tx1"/>
                 </a:solidFill>
                 <a:latin typeface="Calibri Light" panose="020F0302020204030204" pitchFamily="34" charset="0"/>
                 <a:cs typeface="Calibri Light" panose="020F0302020204030204" pitchFamily="34" charset="0"/>
               </a:rPr>
-              <a:t>va</a:t>
-            </a:r>
-            <a:r>
-              <a:rPr lang="en-US" dirty="0">
-                <a:solidFill>
-                  <a:schemeClr val="tx1"/>
-                </a:solidFill>
-                <a:latin typeface="Calibri Light" panose="020F0302020204030204" pitchFamily="34" charset="0"/>
-                <a:cs typeface="Calibri Light" panose="020F0302020204030204" pitchFamily="34" charset="0"/>
-              </a:rPr>
-              <a:t> a </a:t>
-            </a:r>
-            <a:r>
-              <a:rPr lang="en-US" dirty="0" err="1">
-                <a:solidFill>
-                  <a:schemeClr val="tx1"/>
-                </a:solidFill>
-                <a:latin typeface="Calibri Light" panose="020F0302020204030204" pitchFamily="34" charset="0"/>
-                <a:cs typeface="Calibri Light" panose="020F0302020204030204" pitchFamily="34" charset="0"/>
-              </a:rPr>
-              <a:t>simular</a:t>
-            </a:r>
-            <a:endParaRPr lang="es-CO" dirty="0">
-              <a:solidFill>
-                <a:schemeClr val="tx1"/>
-              </a:solidFill>
-              <a:latin typeface="Calibri Light" panose="020F0302020204030204" pitchFamily="34" charset="0"/>
-              <a:cs typeface="Calibri Light" panose="020F0302020204030204" pitchFamily="34" charset="0"/>
-            </a:endParaRPr>
+              <a:t>Se hizo un análisis de cómo varían las cantidades macroscópicas al modificar las condiciones iniciales </a:t>
+            </a:r>
           </a:p>
         </p:txBody>
       </p:sp>
+      <p:pic>
+        <p:nvPicPr>
+          <p:cNvPr id="1026" name="Picture 2" descr="https://i.ytimg.com/vi/q-7qe4FBajo/maxresdefault.jpg">
+            <a:extLst>
+              <a:ext uri="{FF2B5EF4-FFF2-40B4-BE49-F238E27FC236}">
+                <a16:creationId xmlns:a16="http://schemas.microsoft.com/office/drawing/2014/main" id="{69D9AE4A-ABF6-4F63-B90A-E08D0FFDC50C}"/>
+              </a:ext>
+            </a:extLst>
+          </p:cNvPr>
+          <p:cNvPicPr>
+            <a:picLocks noChangeAspect="1" noChangeArrowheads="1"/>
+          </p:cNvPicPr>
+          <p:nvPr/>
+        </p:nvPicPr>
+        <p:blipFill>
+          <a:blip r:embed="rId2">
+            <a:extLst>
+              <a:ext uri="{28A0092B-C50C-407E-A947-70E740481C1C}">
+                <a14:useLocalDpi xmlns:a14="http://schemas.microsoft.com/office/drawing/2010/main" val="0"/>
+              </a:ext>
+            </a:extLst>
+          </a:blip>
+          <a:srcRect/>
+          <a:stretch>
+            <a:fillRect/>
+          </a:stretch>
+        </p:blipFill>
+        <p:spPr bwMode="auto">
+          <a:xfrm>
+            <a:off x="1143000" y="2268835"/>
+            <a:ext cx="6519081" cy="3256354"/>
+          </a:xfrm>
+          <a:prstGeom prst="rect">
+            <a:avLst/>
+          </a:prstGeom>
+          <a:noFill/>
+          <a:extLst>
+            <a:ext uri="{909E8E84-426E-40DD-AFC4-6F175D3DCCD1}">
+              <a14:hiddenFill xmlns:a14="http://schemas.microsoft.com/office/drawing/2010/main">
+                <a:solidFill>
+                  <a:srgbClr val="FFFFFF"/>
+                </a:solidFill>
+              </a14:hiddenFill>
+            </a:ext>
+          </a:extLst>
+        </p:spPr>
+      </p:pic>
     </p:spTree>
     <p:extLst>
       <p:ext uri="{BB962C8B-B14F-4D97-AF65-F5344CB8AC3E}">
@@ -4873,26 +4697,58 @@
         </p:nvSpPr>
         <p:spPr>
           <a:xfrm>
-            <a:off x="1143000" y="2047009"/>
-            <a:ext cx="9872871" cy="4038600"/>
+            <a:off x="1143000" y="2361450"/>
+            <a:ext cx="4521200" cy="2872124"/>
           </a:xfrm>
         </p:spPr>
         <p:txBody>
-          <a:bodyPr/>
+          <a:bodyPr>
+            <a:normAutofit/>
+          </a:bodyPr>
           <a:lstStyle/>
           <a:p>
             <a:r>
-              <a:rPr lang="en-US" dirty="0" err="1">
+              <a:rPr lang="en-US" sz="1900" dirty="0">
                 <a:solidFill>
                   <a:schemeClr val="tx1"/>
                 </a:solidFill>
                 <a:latin typeface="Calibri Light" panose="020F0302020204030204" pitchFamily="34" charset="0"/>
                 <a:cs typeface="Calibri Light" panose="020F0302020204030204" pitchFamily="34" charset="0"/>
               </a:rPr>
-              <a:t>por</a:t>
-            </a:r>
-            <a:r>
-              <a:rPr lang="en-US" dirty="0">
+              <a:t>Este </a:t>
+            </a:r>
+            <a:r>
+              <a:rPr lang="en-US" sz="1900" dirty="0" err="1">
+                <a:solidFill>
+                  <a:schemeClr val="tx1"/>
+                </a:solidFill>
+                <a:latin typeface="Calibri Light" panose="020F0302020204030204" pitchFamily="34" charset="0"/>
+                <a:cs typeface="Calibri Light" panose="020F0302020204030204" pitchFamily="34" charset="0"/>
+              </a:rPr>
+              <a:t>tipo</a:t>
+            </a:r>
+            <a:r>
+              <a:rPr lang="en-US" sz="1900" dirty="0">
+                <a:solidFill>
+                  <a:schemeClr val="tx1"/>
+                </a:solidFill>
+                <a:latin typeface="Calibri Light" panose="020F0302020204030204" pitchFamily="34" charset="0"/>
+                <a:cs typeface="Calibri Light" panose="020F0302020204030204" pitchFamily="34" charset="0"/>
+              </a:rPr>
+              <a:t> de </a:t>
+            </a:r>
+            <a:r>
+              <a:rPr lang="en-US" sz="1900" dirty="0" err="1">
+                <a:solidFill>
+                  <a:schemeClr val="tx1"/>
+                </a:solidFill>
+                <a:latin typeface="Calibri Light" panose="020F0302020204030204" pitchFamily="34" charset="0"/>
+                <a:cs typeface="Calibri Light" panose="020F0302020204030204" pitchFamily="34" charset="0"/>
+              </a:rPr>
+              <a:t>simulaciones</a:t>
+            </a:r>
+            <a:r>
+              <a:rPr lang="en-US" sz="1900" dirty="0">
                 <a:solidFill>
                   <a:schemeClr val="tx1"/>
                 </a:solidFill>
@@ -4902,17 +4758,17 @@
               <a:t> </a:t>
             </a:r>
             <a:r>
-              <a:rPr lang="en-US" dirty="0" err="1">
+              <a:rPr lang="en-US" sz="1900" dirty="0" err="1">
                 <a:solidFill>
                   <a:schemeClr val="tx1"/>
                 </a:solidFill>
                 <a:latin typeface="Calibri Light" panose="020F0302020204030204" pitchFamily="34" charset="0"/>
                 <a:cs typeface="Calibri Light" panose="020F0302020204030204" pitchFamily="34" charset="0"/>
               </a:rPr>
-              <a:t>qué</a:t>
-            </a:r>
-            <a:r>
-              <a:rPr lang="en-US" dirty="0">
+              <a:t>es</a:t>
+            </a:r>
+            <a:r>
+              <a:rPr lang="en-US" sz="1900" dirty="0">
                 <a:solidFill>
                   <a:schemeClr val="tx1"/>
                 </a:solidFill>
@@ -4922,7 +4778,7 @@
               <a:t> </a:t>
             </a:r>
             <a:r>
-              <a:rPr lang="en-US" dirty="0" err="1">
+              <a:rPr lang="en-US" sz="1900" dirty="0" err="1">
                 <a:solidFill>
                   <a:schemeClr val="tx1"/>
                 </a:solidFill>
@@ -4932,56 +4788,647 @@
               <a:t>importante</a:t>
             </a:r>
             <a:r>
-              <a:rPr lang="en-US" dirty="0">
+              <a:rPr lang="en-US" sz="1900" dirty="0">
                 <a:solidFill>
                   <a:schemeClr val="tx1"/>
                 </a:solidFill>
                 <a:latin typeface="Calibri Light" panose="020F0302020204030204" pitchFamily="34" charset="0"/>
                 <a:cs typeface="Calibri Light" panose="020F0302020204030204" pitchFamily="34" charset="0"/>
               </a:rPr>
-              <a:t> para la </a:t>
-            </a:r>
-            <a:r>
-              <a:rPr lang="en-US" dirty="0" err="1">
+              <a:t> </a:t>
+            </a:r>
+            <a:r>
+              <a:rPr lang="en-US" sz="1900" dirty="0" err="1">
                 <a:solidFill>
                   <a:schemeClr val="tx1"/>
                 </a:solidFill>
                 <a:latin typeface="Calibri Light" panose="020F0302020204030204" pitchFamily="34" charset="0"/>
                 <a:cs typeface="Calibri Light" panose="020F0302020204030204" pitchFamily="34" charset="0"/>
               </a:rPr>
-              <a:t>ciencia</a:t>
-            </a:r>
-            <a:r>
-              <a:rPr lang="en-US" dirty="0">
+              <a:t>porque</a:t>
+            </a:r>
+            <a:r>
+              <a:rPr lang="en-US" sz="1900" dirty="0">
                 <a:solidFill>
                   <a:schemeClr val="tx1"/>
                 </a:solidFill>
                 <a:latin typeface="Calibri Light" panose="020F0302020204030204" pitchFamily="34" charset="0"/>
                 <a:cs typeface="Calibri Light" panose="020F0302020204030204" pitchFamily="34" charset="0"/>
               </a:rPr>
-              <a:t> (</a:t>
-            </a:r>
-            <a:r>
-              <a:rPr lang="en-US" dirty="0" err="1">
+              <a:t> </a:t>
+            </a:r>
+            <a:r>
+              <a:rPr lang="en-US" sz="1900" dirty="0" err="1">
                 <a:solidFill>
                   <a:schemeClr val="tx1"/>
                 </a:solidFill>
                 <a:latin typeface="Calibri Light" panose="020F0302020204030204" pitchFamily="34" charset="0"/>
                 <a:cs typeface="Calibri Light" panose="020F0302020204030204" pitchFamily="34" charset="0"/>
               </a:rPr>
-              <a:t>propuesta</a:t>
-            </a:r>
-            <a:r>
-              <a:rPr lang="en-US" dirty="0">
+              <a:t>los</a:t>
+            </a:r>
+            <a:r>
+              <a:rPr lang="en-US" sz="1900" dirty="0">
                 <a:solidFill>
                   <a:schemeClr val="tx1"/>
                 </a:solidFill>
                 <a:latin typeface="Calibri Light" panose="020F0302020204030204" pitchFamily="34" charset="0"/>
                 <a:cs typeface="Calibri Light" panose="020F0302020204030204" pitchFamily="34" charset="0"/>
               </a:rPr>
-              <a:t>)</a:t>
-            </a:r>
-            <a:endParaRPr lang="es-CO" dirty="0">
+              <a:t> </a:t>
+            </a:r>
+            <a:r>
+              <a:rPr lang="en-US" sz="1900" dirty="0" err="1">
+                <a:solidFill>
+                  <a:schemeClr val="tx1"/>
+                </a:solidFill>
+                <a:latin typeface="Calibri Light" panose="020F0302020204030204" pitchFamily="34" charset="0"/>
+                <a:cs typeface="Calibri Light" panose="020F0302020204030204" pitchFamily="34" charset="0"/>
+              </a:rPr>
+              <a:t>aviones</a:t>
+            </a:r>
+            <a:r>
+              <a:rPr lang="en-US" sz="1900" dirty="0">
+                <a:solidFill>
+                  <a:schemeClr val="tx1"/>
+                </a:solidFill>
+                <a:latin typeface="Calibri Light" panose="020F0302020204030204" pitchFamily="34" charset="0"/>
+                <a:cs typeface="Calibri Light" panose="020F0302020204030204" pitchFamily="34" charset="0"/>
+              </a:rPr>
+              <a:t> son </a:t>
+            </a:r>
+            <a:r>
+              <a:rPr lang="en-US" sz="1900" dirty="0" err="1">
+                <a:solidFill>
+                  <a:schemeClr val="tx1"/>
+                </a:solidFill>
+                <a:latin typeface="Calibri Light" panose="020F0302020204030204" pitchFamily="34" charset="0"/>
+                <a:cs typeface="Calibri Light" panose="020F0302020204030204" pitchFamily="34" charset="0"/>
+              </a:rPr>
+              <a:t>cada</a:t>
+            </a:r>
+            <a:r>
+              <a:rPr lang="en-US" sz="1900" dirty="0">
+                <a:solidFill>
+                  <a:schemeClr val="tx1"/>
+                </a:solidFill>
+                <a:latin typeface="Calibri Light" panose="020F0302020204030204" pitchFamily="34" charset="0"/>
+                <a:cs typeface="Calibri Light" panose="020F0302020204030204" pitchFamily="34" charset="0"/>
+              </a:rPr>
+              <a:t> </a:t>
+            </a:r>
+            <a:r>
+              <a:rPr lang="en-US" sz="1900" dirty="0" err="1">
+                <a:solidFill>
+                  <a:schemeClr val="tx1"/>
+                </a:solidFill>
+                <a:latin typeface="Calibri Light" panose="020F0302020204030204" pitchFamily="34" charset="0"/>
+                <a:cs typeface="Calibri Light" panose="020F0302020204030204" pitchFamily="34" charset="0"/>
+              </a:rPr>
+              <a:t>vez</a:t>
+            </a:r>
+            <a:r>
+              <a:rPr lang="en-US" sz="1900" dirty="0">
+                <a:solidFill>
+                  <a:schemeClr val="tx1"/>
+                </a:solidFill>
+                <a:latin typeface="Calibri Light" panose="020F0302020204030204" pitchFamily="34" charset="0"/>
+                <a:cs typeface="Calibri Light" panose="020F0302020204030204" pitchFamily="34" charset="0"/>
+              </a:rPr>
+              <a:t> </a:t>
+            </a:r>
+            <a:r>
+              <a:rPr lang="en-US" sz="1900" dirty="0" err="1">
+                <a:solidFill>
+                  <a:schemeClr val="tx1"/>
+                </a:solidFill>
+                <a:latin typeface="Calibri Light" panose="020F0302020204030204" pitchFamily="34" charset="0"/>
+                <a:cs typeface="Calibri Light" panose="020F0302020204030204" pitchFamily="34" charset="0"/>
+              </a:rPr>
+              <a:t>más</a:t>
+            </a:r>
+            <a:r>
+              <a:rPr lang="en-US" sz="1900" dirty="0">
+                <a:solidFill>
+                  <a:schemeClr val="tx1"/>
+                </a:solidFill>
+                <a:latin typeface="Calibri Light" panose="020F0302020204030204" pitchFamily="34" charset="0"/>
+                <a:cs typeface="Calibri Light" panose="020F0302020204030204" pitchFamily="34" charset="0"/>
+              </a:rPr>
+              <a:t> </a:t>
+            </a:r>
+            <a:r>
+              <a:rPr lang="en-US" sz="1900" dirty="0" err="1">
+                <a:solidFill>
+                  <a:schemeClr val="tx1"/>
+                </a:solidFill>
+                <a:latin typeface="Calibri Light" panose="020F0302020204030204" pitchFamily="34" charset="0"/>
+                <a:cs typeface="Calibri Light" panose="020F0302020204030204" pitchFamily="34" charset="0"/>
+              </a:rPr>
+              <a:t>comúnes</a:t>
+            </a:r>
+            <a:r>
+              <a:rPr lang="en-US" sz="1900" dirty="0">
+                <a:solidFill>
+                  <a:schemeClr val="tx1"/>
+                </a:solidFill>
+                <a:latin typeface="Calibri Light" panose="020F0302020204030204" pitchFamily="34" charset="0"/>
+                <a:cs typeface="Calibri Light" panose="020F0302020204030204" pitchFamily="34" charset="0"/>
+              </a:rPr>
+              <a:t> </a:t>
+            </a:r>
+            <a:r>
+              <a:rPr lang="en-US" sz="1900" dirty="0" err="1">
+                <a:solidFill>
+                  <a:schemeClr val="tx1"/>
+                </a:solidFill>
+                <a:latin typeface="Calibri Light" panose="020F0302020204030204" pitchFamily="34" charset="0"/>
+                <a:cs typeface="Calibri Light" panose="020F0302020204030204" pitchFamily="34" charset="0"/>
+              </a:rPr>
+              <a:t>como</a:t>
+            </a:r>
+            <a:r>
+              <a:rPr lang="en-US" sz="1900" dirty="0">
+                <a:solidFill>
+                  <a:schemeClr val="tx1"/>
+                </a:solidFill>
+                <a:latin typeface="Calibri Light" panose="020F0302020204030204" pitchFamily="34" charset="0"/>
+                <a:cs typeface="Calibri Light" panose="020F0302020204030204" pitchFamily="34" charset="0"/>
+              </a:rPr>
+              <a:t> </a:t>
+            </a:r>
+            <a:r>
+              <a:rPr lang="en-US" sz="1900" dirty="0" err="1">
+                <a:solidFill>
+                  <a:schemeClr val="tx1"/>
+                </a:solidFill>
+                <a:latin typeface="Calibri Light" panose="020F0302020204030204" pitchFamily="34" charset="0"/>
+                <a:cs typeface="Calibri Light" panose="020F0302020204030204" pitchFamily="34" charset="0"/>
+              </a:rPr>
+              <a:t>métodos</a:t>
+            </a:r>
+            <a:r>
+              <a:rPr lang="en-US" sz="1900" dirty="0">
+                <a:solidFill>
+                  <a:schemeClr val="tx1"/>
+                </a:solidFill>
+                <a:latin typeface="Calibri Light" panose="020F0302020204030204" pitchFamily="34" charset="0"/>
+                <a:cs typeface="Calibri Light" panose="020F0302020204030204" pitchFamily="34" charset="0"/>
+              </a:rPr>
+              <a:t> de </a:t>
+            </a:r>
+            <a:r>
+              <a:rPr lang="en-US" sz="1900" dirty="0" err="1">
+                <a:solidFill>
+                  <a:schemeClr val="tx1"/>
+                </a:solidFill>
+                <a:latin typeface="Calibri Light" panose="020F0302020204030204" pitchFamily="34" charset="0"/>
+                <a:cs typeface="Calibri Light" panose="020F0302020204030204" pitchFamily="34" charset="0"/>
+              </a:rPr>
+              <a:t>transporte</a:t>
+            </a:r>
+            <a:endParaRPr lang="en-US" sz="1900" dirty="0">
+              <a:solidFill>
+                <a:schemeClr val="tx1"/>
+              </a:solidFill>
+              <a:latin typeface="Calibri Light" panose="020F0302020204030204" pitchFamily="34" charset="0"/>
+              <a:cs typeface="Calibri Light" panose="020F0302020204030204" pitchFamily="34" charset="0"/>
+            </a:endParaRPr>
+          </a:p>
+          <a:p>
+            <a:r>
+              <a:rPr lang="en-US" sz="1900" dirty="0" err="1">
+                <a:solidFill>
+                  <a:schemeClr val="tx1"/>
+                </a:solidFill>
+                <a:latin typeface="Calibri Light" panose="020F0302020204030204" pitchFamily="34" charset="0"/>
+                <a:cs typeface="Calibri Light" panose="020F0302020204030204" pitchFamily="34" charset="0"/>
+              </a:rPr>
+              <a:t>Cada</a:t>
+            </a:r>
+            <a:r>
+              <a:rPr lang="en-US" sz="1900" dirty="0">
+                <a:solidFill>
+                  <a:schemeClr val="tx1"/>
+                </a:solidFill>
+                <a:latin typeface="Calibri Light" panose="020F0302020204030204" pitchFamily="34" charset="0"/>
+                <a:cs typeface="Calibri Light" panose="020F0302020204030204" pitchFamily="34" charset="0"/>
+              </a:rPr>
+              <a:t> </a:t>
+            </a:r>
+            <a:r>
+              <a:rPr lang="en-US" sz="1900" dirty="0" err="1">
+                <a:solidFill>
+                  <a:schemeClr val="tx1"/>
+                </a:solidFill>
+                <a:latin typeface="Calibri Light" panose="020F0302020204030204" pitchFamily="34" charset="0"/>
+                <a:cs typeface="Calibri Light" panose="020F0302020204030204" pitchFamily="34" charset="0"/>
+              </a:rPr>
+              <a:t>día</a:t>
+            </a:r>
+            <a:r>
+              <a:rPr lang="en-US" sz="1900" dirty="0">
+                <a:solidFill>
+                  <a:schemeClr val="tx1"/>
+                </a:solidFill>
+                <a:latin typeface="Calibri Light" panose="020F0302020204030204" pitchFamily="34" charset="0"/>
+                <a:cs typeface="Calibri Light" panose="020F0302020204030204" pitchFamily="34" charset="0"/>
+              </a:rPr>
+              <a:t> </a:t>
+            </a:r>
+            <a:r>
+              <a:rPr lang="en-US" sz="1900" dirty="0" err="1">
+                <a:solidFill>
+                  <a:schemeClr val="tx1"/>
+                </a:solidFill>
+                <a:latin typeface="Calibri Light" panose="020F0302020204030204" pitchFamily="34" charset="0"/>
+                <a:cs typeface="Calibri Light" panose="020F0302020204030204" pitchFamily="34" charset="0"/>
+              </a:rPr>
+              <a:t>viaja</a:t>
+            </a:r>
+            <a:r>
+              <a:rPr lang="en-US" sz="1900" dirty="0">
+                <a:solidFill>
+                  <a:schemeClr val="tx1"/>
+                </a:solidFill>
+                <a:latin typeface="Calibri Light" panose="020F0302020204030204" pitchFamily="34" charset="0"/>
+                <a:cs typeface="Calibri Light" panose="020F0302020204030204" pitchFamily="34" charset="0"/>
+              </a:rPr>
+              <a:t> en </a:t>
+            </a:r>
+            <a:r>
+              <a:rPr lang="en-US" sz="1900" dirty="0" err="1">
+                <a:solidFill>
+                  <a:schemeClr val="tx1"/>
+                </a:solidFill>
+                <a:latin typeface="Calibri Light" panose="020F0302020204030204" pitchFamily="34" charset="0"/>
+                <a:cs typeface="Calibri Light" panose="020F0302020204030204" pitchFamily="34" charset="0"/>
+              </a:rPr>
+              <a:t>avión</a:t>
+            </a:r>
+            <a:r>
+              <a:rPr lang="en-US" sz="1900" dirty="0">
+                <a:solidFill>
+                  <a:schemeClr val="tx1"/>
+                </a:solidFill>
+                <a:latin typeface="Calibri Light" panose="020F0302020204030204" pitchFamily="34" charset="0"/>
+                <a:cs typeface="Calibri Light" panose="020F0302020204030204" pitchFamily="34" charset="0"/>
+              </a:rPr>
+              <a:t> un </a:t>
+            </a:r>
+            <a:r>
+              <a:rPr lang="en-US" sz="1900" dirty="0" err="1">
+                <a:solidFill>
+                  <a:schemeClr val="tx1"/>
+                </a:solidFill>
+                <a:latin typeface="Calibri Light" panose="020F0302020204030204" pitchFamily="34" charset="0"/>
+                <a:cs typeface="Calibri Light" panose="020F0302020204030204" pitchFamily="34" charset="0"/>
+              </a:rPr>
+              <a:t>promedio</a:t>
+            </a:r>
+            <a:r>
+              <a:rPr lang="en-US" sz="1900" dirty="0">
+                <a:solidFill>
+                  <a:schemeClr val="tx1"/>
+                </a:solidFill>
+                <a:latin typeface="Calibri Light" panose="020F0302020204030204" pitchFamily="34" charset="0"/>
+                <a:cs typeface="Calibri Light" panose="020F0302020204030204" pitchFamily="34" charset="0"/>
+              </a:rPr>
+              <a:t> de 8 </a:t>
+            </a:r>
+            <a:r>
+              <a:rPr lang="en-US" sz="1900" dirty="0" err="1">
+                <a:solidFill>
+                  <a:schemeClr val="tx1"/>
+                </a:solidFill>
+                <a:latin typeface="Calibri Light" panose="020F0302020204030204" pitchFamily="34" charset="0"/>
+                <a:cs typeface="Calibri Light" panose="020F0302020204030204" pitchFamily="34" charset="0"/>
+              </a:rPr>
+              <a:t>millones</a:t>
+            </a:r>
+            <a:r>
+              <a:rPr lang="en-US" sz="1900" dirty="0">
+                <a:solidFill>
+                  <a:schemeClr val="tx1"/>
+                </a:solidFill>
+                <a:latin typeface="Calibri Light" panose="020F0302020204030204" pitchFamily="34" charset="0"/>
+                <a:cs typeface="Calibri Light" panose="020F0302020204030204" pitchFamily="34" charset="0"/>
+              </a:rPr>
+              <a:t> de personas</a:t>
+            </a:r>
+          </a:p>
+          <a:p>
+            <a:r>
+              <a:rPr lang="en-US" sz="1900" dirty="0">
+                <a:solidFill>
+                  <a:schemeClr val="tx1"/>
+                </a:solidFill>
+                <a:latin typeface="Calibri Light" panose="020F0302020204030204" pitchFamily="34" charset="0"/>
+                <a:cs typeface="Calibri Light" panose="020F0302020204030204" pitchFamily="34" charset="0"/>
+              </a:rPr>
+              <a:t>Si se </a:t>
+            </a:r>
+            <a:r>
+              <a:rPr lang="en-US" sz="1900" dirty="0" err="1">
+                <a:solidFill>
+                  <a:schemeClr val="tx1"/>
+                </a:solidFill>
+                <a:latin typeface="Calibri Light" panose="020F0302020204030204" pitchFamily="34" charset="0"/>
+                <a:cs typeface="Calibri Light" panose="020F0302020204030204" pitchFamily="34" charset="0"/>
+              </a:rPr>
+              <a:t>entienden</a:t>
+            </a:r>
+            <a:r>
+              <a:rPr lang="en-US" sz="1900" dirty="0">
+                <a:solidFill>
+                  <a:schemeClr val="tx1"/>
+                </a:solidFill>
+                <a:latin typeface="Calibri Light" panose="020F0302020204030204" pitchFamily="34" charset="0"/>
+                <a:cs typeface="Calibri Light" panose="020F0302020204030204" pitchFamily="34" charset="0"/>
+              </a:rPr>
+              <a:t> </a:t>
+            </a:r>
+            <a:r>
+              <a:rPr lang="en-US" sz="1900" dirty="0" err="1">
+                <a:solidFill>
+                  <a:schemeClr val="tx1"/>
+                </a:solidFill>
+                <a:latin typeface="Calibri Light" panose="020F0302020204030204" pitchFamily="34" charset="0"/>
+                <a:cs typeface="Calibri Light" panose="020F0302020204030204" pitchFamily="34" charset="0"/>
+              </a:rPr>
+              <a:t>los</a:t>
+            </a:r>
+            <a:r>
+              <a:rPr lang="en-US" sz="1900" dirty="0">
+                <a:solidFill>
+                  <a:schemeClr val="tx1"/>
+                </a:solidFill>
+                <a:latin typeface="Calibri Light" panose="020F0302020204030204" pitchFamily="34" charset="0"/>
+                <a:cs typeface="Calibri Light" panose="020F0302020204030204" pitchFamily="34" charset="0"/>
+              </a:rPr>
+              <a:t> </a:t>
+            </a:r>
+            <a:r>
+              <a:rPr lang="en-US" sz="1900" dirty="0" err="1">
+                <a:solidFill>
+                  <a:schemeClr val="tx1"/>
+                </a:solidFill>
+                <a:latin typeface="Calibri Light" panose="020F0302020204030204" pitchFamily="34" charset="0"/>
+                <a:cs typeface="Calibri Light" panose="020F0302020204030204" pitchFamily="34" charset="0"/>
+              </a:rPr>
+              <a:t>fenómenos</a:t>
+            </a:r>
+            <a:r>
+              <a:rPr lang="en-US" sz="1900" dirty="0">
+                <a:solidFill>
+                  <a:schemeClr val="tx1"/>
+                </a:solidFill>
+                <a:latin typeface="Calibri Light" panose="020F0302020204030204" pitchFamily="34" charset="0"/>
+                <a:cs typeface="Calibri Light" panose="020F0302020204030204" pitchFamily="34" charset="0"/>
+              </a:rPr>
+              <a:t> que </a:t>
+            </a:r>
+            <a:r>
+              <a:rPr lang="en-US" sz="1900" dirty="0" err="1">
+                <a:solidFill>
+                  <a:schemeClr val="tx1"/>
+                </a:solidFill>
+                <a:latin typeface="Calibri Light" panose="020F0302020204030204" pitchFamily="34" charset="0"/>
+                <a:cs typeface="Calibri Light" panose="020F0302020204030204" pitchFamily="34" charset="0"/>
+              </a:rPr>
+              <a:t>afectan</a:t>
+            </a:r>
+            <a:r>
+              <a:rPr lang="en-US" sz="1900" dirty="0">
+                <a:solidFill>
+                  <a:schemeClr val="tx1"/>
+                </a:solidFill>
+                <a:latin typeface="Calibri Light" panose="020F0302020204030204" pitchFamily="34" charset="0"/>
+                <a:cs typeface="Calibri Light" panose="020F0302020204030204" pitchFamily="34" charset="0"/>
+              </a:rPr>
+              <a:t> el </a:t>
+            </a:r>
+            <a:r>
+              <a:rPr lang="en-US" sz="1900" dirty="0" err="1">
+                <a:solidFill>
+                  <a:schemeClr val="tx1"/>
+                </a:solidFill>
+                <a:latin typeface="Calibri Light" panose="020F0302020204030204" pitchFamily="34" charset="0"/>
+                <a:cs typeface="Calibri Light" panose="020F0302020204030204" pitchFamily="34" charset="0"/>
+              </a:rPr>
+              <a:t>vuelo</a:t>
+            </a:r>
+            <a:r>
+              <a:rPr lang="en-US" sz="1900" dirty="0">
+                <a:solidFill>
+                  <a:schemeClr val="tx1"/>
+                </a:solidFill>
+                <a:latin typeface="Calibri Light" panose="020F0302020204030204" pitchFamily="34" charset="0"/>
+                <a:cs typeface="Calibri Light" panose="020F0302020204030204" pitchFamily="34" charset="0"/>
+              </a:rPr>
+              <a:t> de </a:t>
+            </a:r>
+            <a:r>
+              <a:rPr lang="en-US" sz="1900" dirty="0" err="1">
+                <a:solidFill>
+                  <a:schemeClr val="tx1"/>
+                </a:solidFill>
+                <a:latin typeface="Calibri Light" panose="020F0302020204030204" pitchFamily="34" charset="0"/>
+                <a:cs typeface="Calibri Light" panose="020F0302020204030204" pitchFamily="34" charset="0"/>
+              </a:rPr>
+              <a:t>los</a:t>
+            </a:r>
+            <a:r>
+              <a:rPr lang="en-US" sz="1900" dirty="0">
+                <a:solidFill>
+                  <a:schemeClr val="tx1"/>
+                </a:solidFill>
+                <a:latin typeface="Calibri Light" panose="020F0302020204030204" pitchFamily="34" charset="0"/>
+                <a:cs typeface="Calibri Light" panose="020F0302020204030204" pitchFamily="34" charset="0"/>
+              </a:rPr>
+              <a:t> </a:t>
+            </a:r>
+            <a:r>
+              <a:rPr lang="en-US" sz="1900" dirty="0" err="1">
+                <a:solidFill>
+                  <a:schemeClr val="tx1"/>
+                </a:solidFill>
+                <a:latin typeface="Calibri Light" panose="020F0302020204030204" pitchFamily="34" charset="0"/>
+                <a:cs typeface="Calibri Light" panose="020F0302020204030204" pitchFamily="34" charset="0"/>
+              </a:rPr>
+              <a:t>aviones</a:t>
+            </a:r>
+            <a:r>
+              <a:rPr lang="en-US" sz="1900" dirty="0">
+                <a:solidFill>
+                  <a:schemeClr val="tx1"/>
+                </a:solidFill>
+                <a:latin typeface="Calibri Light" panose="020F0302020204030204" pitchFamily="34" charset="0"/>
+                <a:cs typeface="Calibri Light" panose="020F0302020204030204" pitchFamily="34" charset="0"/>
+              </a:rPr>
+              <a:t> se </a:t>
+            </a:r>
+            <a:r>
+              <a:rPr lang="en-US" sz="1900" dirty="0" err="1">
+                <a:solidFill>
+                  <a:schemeClr val="tx1"/>
+                </a:solidFill>
+                <a:latin typeface="Calibri Light" panose="020F0302020204030204" pitchFamily="34" charset="0"/>
+                <a:cs typeface="Calibri Light" panose="020F0302020204030204" pitchFamily="34" charset="0"/>
+              </a:rPr>
+              <a:t>puede</a:t>
+            </a:r>
+            <a:r>
+              <a:rPr lang="en-US" sz="1900" dirty="0">
+                <a:solidFill>
+                  <a:schemeClr val="tx1"/>
+                </a:solidFill>
+                <a:latin typeface="Calibri Light" panose="020F0302020204030204" pitchFamily="34" charset="0"/>
+                <a:cs typeface="Calibri Light" panose="020F0302020204030204" pitchFamily="34" charset="0"/>
+              </a:rPr>
+              <a:t> </a:t>
+            </a:r>
+            <a:r>
+              <a:rPr lang="en-US" sz="1900" dirty="0" err="1">
+                <a:solidFill>
+                  <a:schemeClr val="tx1"/>
+                </a:solidFill>
+                <a:latin typeface="Calibri Light" panose="020F0302020204030204" pitchFamily="34" charset="0"/>
+                <a:cs typeface="Calibri Light" panose="020F0302020204030204" pitchFamily="34" charset="0"/>
+              </a:rPr>
+              <a:t>reducir</a:t>
+            </a:r>
+            <a:r>
+              <a:rPr lang="en-US" sz="1900" dirty="0">
+                <a:solidFill>
+                  <a:schemeClr val="tx1"/>
+                </a:solidFill>
+                <a:latin typeface="Calibri Light" panose="020F0302020204030204" pitchFamily="34" charset="0"/>
+                <a:cs typeface="Calibri Light" panose="020F0302020204030204" pitchFamily="34" charset="0"/>
+              </a:rPr>
+              <a:t> la </a:t>
+            </a:r>
+            <a:r>
+              <a:rPr lang="en-US" sz="1900" dirty="0" err="1">
+                <a:solidFill>
+                  <a:schemeClr val="tx1"/>
+                </a:solidFill>
+                <a:latin typeface="Calibri Light" panose="020F0302020204030204" pitchFamily="34" charset="0"/>
+                <a:cs typeface="Calibri Light" panose="020F0302020204030204" pitchFamily="34" charset="0"/>
+              </a:rPr>
+              <a:t>probabilidad</a:t>
+            </a:r>
+            <a:r>
+              <a:rPr lang="en-US" sz="1900" dirty="0">
+                <a:solidFill>
+                  <a:schemeClr val="tx1"/>
+                </a:solidFill>
+                <a:latin typeface="Calibri Light" panose="020F0302020204030204" pitchFamily="34" charset="0"/>
+                <a:cs typeface="Calibri Light" panose="020F0302020204030204" pitchFamily="34" charset="0"/>
+              </a:rPr>
+              <a:t> de </a:t>
+            </a:r>
+            <a:r>
+              <a:rPr lang="en-US" sz="1900" dirty="0" err="1">
+                <a:solidFill>
+                  <a:schemeClr val="tx1"/>
+                </a:solidFill>
+                <a:latin typeface="Calibri Light" panose="020F0302020204030204" pitchFamily="34" charset="0"/>
+                <a:cs typeface="Calibri Light" panose="020F0302020204030204" pitchFamily="34" charset="0"/>
+              </a:rPr>
+              <a:t>accidentes</a:t>
+            </a:r>
+            <a:r>
+              <a:rPr lang="en-US" sz="1900" dirty="0">
+                <a:solidFill>
+                  <a:schemeClr val="tx1"/>
+                </a:solidFill>
+                <a:latin typeface="Calibri Light" panose="020F0302020204030204" pitchFamily="34" charset="0"/>
+                <a:cs typeface="Calibri Light" panose="020F0302020204030204" pitchFamily="34" charset="0"/>
+              </a:rPr>
+              <a:t> y </a:t>
+            </a:r>
+            <a:r>
+              <a:rPr lang="en-US" sz="1900" dirty="0" err="1">
+                <a:solidFill>
+                  <a:schemeClr val="tx1"/>
+                </a:solidFill>
+                <a:latin typeface="Calibri Light" panose="020F0302020204030204" pitchFamily="34" charset="0"/>
+                <a:cs typeface="Calibri Light" panose="020F0302020204030204" pitchFamily="34" charset="0"/>
+              </a:rPr>
+              <a:t>mejorar</a:t>
+            </a:r>
+            <a:r>
+              <a:rPr lang="en-US" sz="1900" dirty="0">
+                <a:solidFill>
+                  <a:schemeClr val="tx1"/>
+                </a:solidFill>
+                <a:latin typeface="Calibri Light" panose="020F0302020204030204" pitchFamily="34" charset="0"/>
+                <a:cs typeface="Calibri Light" panose="020F0302020204030204" pitchFamily="34" charset="0"/>
+              </a:rPr>
+              <a:t> la </a:t>
+            </a:r>
+            <a:r>
+              <a:rPr lang="en-US" sz="1900" dirty="0" err="1">
+                <a:solidFill>
+                  <a:schemeClr val="tx1"/>
+                </a:solidFill>
+                <a:latin typeface="Calibri Light" panose="020F0302020204030204" pitchFamily="34" charset="0"/>
+                <a:cs typeface="Calibri Light" panose="020F0302020204030204" pitchFamily="34" charset="0"/>
+              </a:rPr>
+              <a:t>eficiencia</a:t>
+            </a:r>
+            <a:r>
+              <a:rPr lang="en-US" sz="1900" dirty="0">
+                <a:solidFill>
+                  <a:schemeClr val="tx1"/>
+                </a:solidFill>
+                <a:latin typeface="Calibri Light" panose="020F0302020204030204" pitchFamily="34" charset="0"/>
+                <a:cs typeface="Calibri Light" panose="020F0302020204030204" pitchFamily="34" charset="0"/>
+              </a:rPr>
+              <a:t> de </a:t>
+            </a:r>
+            <a:r>
+              <a:rPr lang="en-US" sz="1900" dirty="0" err="1">
+                <a:solidFill>
+                  <a:schemeClr val="tx1"/>
+                </a:solidFill>
+                <a:latin typeface="Calibri Light" panose="020F0302020204030204" pitchFamily="34" charset="0"/>
+                <a:cs typeface="Calibri Light" panose="020F0302020204030204" pitchFamily="34" charset="0"/>
+              </a:rPr>
+              <a:t>vuelo</a:t>
+            </a:r>
+            <a:r>
+              <a:rPr lang="en-US" sz="1900" dirty="0">
+                <a:solidFill>
+                  <a:schemeClr val="tx1"/>
+                </a:solidFill>
+                <a:latin typeface="Calibri Light" panose="020F0302020204030204" pitchFamily="34" charset="0"/>
+                <a:cs typeface="Calibri Light" panose="020F0302020204030204" pitchFamily="34" charset="0"/>
+              </a:rPr>
+              <a:t> de </a:t>
+            </a:r>
+            <a:r>
+              <a:rPr lang="en-US" sz="1900" dirty="0" err="1">
+                <a:solidFill>
+                  <a:schemeClr val="tx1"/>
+                </a:solidFill>
+                <a:latin typeface="Calibri Light" panose="020F0302020204030204" pitchFamily="34" charset="0"/>
+                <a:cs typeface="Calibri Light" panose="020F0302020204030204" pitchFamily="34" charset="0"/>
+              </a:rPr>
+              <a:t>éstos</a:t>
+            </a:r>
+            <a:r>
+              <a:rPr lang="en-US" sz="1900" dirty="0">
+                <a:solidFill>
+                  <a:schemeClr val="tx1"/>
+                </a:solidFill>
+                <a:latin typeface="Calibri Light" panose="020F0302020204030204" pitchFamily="34" charset="0"/>
+                <a:cs typeface="Calibri Light" panose="020F0302020204030204" pitchFamily="34" charset="0"/>
+              </a:rPr>
+              <a:t> </a:t>
+            </a:r>
+            <a:endParaRPr lang="es-CO" sz="1900" dirty="0">
               <a:solidFill>
                 <a:schemeClr val="tx1"/>
               </a:solidFill>
@@ -4991,6 +5438,62 @@
           </a:p>
         </p:txBody>
       </p:sp>
+      <p:pic>
+        <p:nvPicPr>
+          <p:cNvPr id="2050" name="Picture 2" descr="http://www.ansys-blog.com/wp-content/uploads/2014/10/image012.jpg">
+            <a:extLst>
+              <a:ext uri="{FF2B5EF4-FFF2-40B4-BE49-F238E27FC236}">
+                <a16:creationId xmlns:a16="http://schemas.microsoft.com/office/drawing/2014/main" id="{50EA7EBF-513C-43A1-B884-A3714ADC27CC}"/>
+              </a:ext>
+            </a:extLst>
+          </p:cNvPr>
+          <p:cNvPicPr>
+            <a:picLocks noChangeAspect="1" noChangeArrowheads="1"/>
+          </p:cNvPicPr>
+          <p:nvPr/>
+        </p:nvPicPr>
+        <p:blipFill>
+          <a:blip r:embed="rId2">
+            <a:extLst>
+              <a:ext uri="{BEBA8EAE-BF5A-486C-A8C5-ECC9F3942E4B}">
+                <a14:imgProps xmlns:a14="http://schemas.microsoft.com/office/drawing/2010/main">
+                  <a14:imgLayer r:embed="rId3">
+                    <a14:imgEffect>
+                      <a14:colorTemperature colorTemp="11200"/>
+                    </a14:imgEffect>
+                  </a14:imgLayer>
+                </a14:imgProps>
+              </a:ext>
+              <a:ext uri="{28A0092B-C50C-407E-A947-70E740481C1C}">
+                <a14:useLocalDpi xmlns:a14="http://schemas.microsoft.com/office/drawing/2010/main" val="0"/>
+              </a:ext>
+            </a:extLst>
+          </a:blip>
+          <a:srcRect/>
+          <a:stretch>
+            <a:fillRect/>
+          </a:stretch>
+        </p:blipFill>
+        <p:spPr bwMode="auto">
+          <a:xfrm>
+            <a:off x="6358466" y="1933787"/>
+            <a:ext cx="4969933" cy="3727450"/>
+          </a:xfrm>
+          <a:prstGeom prst="rect">
+            <a:avLst/>
+          </a:prstGeom>
+          <a:noFill/>
+          <a:extLst>
+            <a:ext uri="{909E8E84-426E-40DD-AFC4-6F175D3DCCD1}">
+              <a14:hiddenFill xmlns:a14="http://schemas.microsoft.com/office/drawing/2010/main">
+                <a:solidFill>
+                  <a:srgbClr val="FFFFFF"/>
+                </a:solidFill>
+              </a14:hiddenFill>
+            </a:ext>
+          </a:extLst>
+        </p:spPr>
+      </p:pic>
     </p:spTree>
     <p:extLst>
       <p:ext uri="{BB962C8B-B14F-4D97-AF65-F5344CB8AC3E}">
@@ -5037,8 +5540,12 @@
           <a:lstStyle/>
           <a:p>
             <a:r>
+              <a:rPr lang="en-US" dirty="0"/>
+              <a:t>Marco </a:t>
+            </a:r>
+            <a:r>
               <a:rPr lang="en-US" dirty="0" err="1"/>
-              <a:t>Teoría</a:t>
+              <a:t>teórico</a:t>
             </a:r>
             <a:endParaRPr lang="es-CO" dirty="0"/>
           </a:p>
@@ -6253,8 +6760,12 @@
           <a:lstStyle/>
           <a:p>
             <a:r>
+              <a:rPr lang="en-US" dirty="0"/>
+              <a:t>Marco </a:t>
+            </a:r>
+            <a:r>
               <a:rPr lang="en-US" dirty="0" err="1"/>
-              <a:t>Teoría</a:t>
+              <a:t>teórico</a:t>
             </a:r>
             <a:endParaRPr lang="es-CO" dirty="0"/>
           </a:p>
@@ -6280,7 +6791,7 @@
             </p:spPr>
             <p:txBody>
               <a:bodyPr>
-                <a:normAutofit/>
+                <a:normAutofit lnSpcReduction="10000"/>
               </a:bodyPr>
               <a:lstStyle/>
               <a:p>
@@ -6288,7 +6799,7 @@
                   <a:buNone/>
                 </a:pPr>
                 <a:r>
-                  <a:rPr lang="en-US" sz="2400" dirty="0">
+                  <a:rPr lang="en-US" sz="2000" dirty="0">
                     <a:solidFill>
                       <a:schemeClr val="tx1"/>
                     </a:solidFill>
@@ -6298,7 +6809,7 @@
                   <a:t>Si se </a:t>
                 </a:r>
                 <a:r>
-                  <a:rPr lang="en-US" sz="2400" dirty="0" err="1">
+                  <a:rPr lang="en-US" sz="2000" dirty="0" err="1">
                     <a:solidFill>
                       <a:schemeClr val="tx1"/>
                     </a:solidFill>
@@ -6308,7 +6819,7 @@
                   <a:t>toma</a:t>
                 </a:r>
                 <a:r>
-                  <a:rPr lang="en-US" sz="2400" dirty="0">
+                  <a:rPr lang="en-US" sz="2000" dirty="0">
                     <a:solidFill>
                       <a:schemeClr val="tx1"/>
                     </a:solidFill>
@@ -6320,7 +6831,7 @@
                 <a14:m>
                   <m:oMath xmlns:m="http://schemas.openxmlformats.org/officeDocument/2006/math">
                     <m:r>
-                      <a:rPr lang="en-US" sz="2400" b="0" i="1" smtClean="0">
+                      <a:rPr lang="en-US" sz="2000" b="0" i="1" smtClean="0">
                         <a:solidFill>
                           <a:schemeClr val="tx1"/>
                         </a:solidFill>
@@ -6330,7 +6841,7 @@
                       <m:t>𝑐</m:t>
                     </m:r>
                     <m:r>
-                      <a:rPr lang="en-US" sz="2400" b="0" i="1" smtClean="0">
+                      <a:rPr lang="en-US" sz="2000" b="0" i="1" smtClean="0">
                         <a:solidFill>
                           <a:schemeClr val="tx1"/>
                         </a:solidFill>
@@ -6342,7 +6853,7 @@
                     <m:f>
                       <m:fPr>
                         <m:ctrlPr>
-                          <a:rPr lang="en-US" sz="2400" b="0" i="1" smtClean="0">
+                          <a:rPr lang="en-US" sz="2000" b="0" i="1" smtClean="0">
                             <a:solidFill>
                               <a:schemeClr val="tx1"/>
                             </a:solidFill>
@@ -6353,7 +6864,7 @@
                       </m:fPr>
                       <m:num>
                         <m:r>
-                          <a:rPr lang="en-US" sz="2400" b="0" i="1" smtClean="0">
+                          <a:rPr lang="en-US" sz="2000" b="0" i="1" smtClean="0">
                             <a:solidFill>
                               <a:schemeClr val="tx1"/>
                             </a:solidFill>
@@ -6364,7 +6875,7 @@
                           <m:t>∆</m:t>
                         </m:r>
                         <m:r>
-                          <a:rPr lang="en-US" sz="2400" b="0" i="1" smtClean="0">
+                          <a:rPr lang="en-US" sz="2000" b="0" i="1" smtClean="0">
                             <a:solidFill>
                               <a:schemeClr val="tx1"/>
                             </a:solidFill>
@@ -6377,7 +6888,7 @@
                       </m:num>
                       <m:den>
                         <m:r>
-                          <a:rPr lang="en-US" sz="2400" i="1">
+                          <a:rPr lang="en-US" sz="2000" i="1">
                             <a:solidFill>
                               <a:schemeClr val="tx1"/>
                             </a:solidFill>
@@ -6388,7 +6899,7 @@
                           <m:t>∆</m:t>
                         </m:r>
                         <m:r>
-                          <a:rPr lang="en-US" sz="2400" b="0" i="1" smtClean="0">
+                          <a:rPr lang="en-US" sz="2000" b="0" i="1" smtClean="0">
                             <a:solidFill>
                               <a:schemeClr val="tx1"/>
                             </a:solidFill>
@@ -6401,7 +6912,7 @@
                       </m:den>
                     </m:f>
                     <m:r>
-                      <a:rPr lang="en-US" sz="2400" b="0" i="1" smtClean="0">
+                      <a:rPr lang="en-US" sz="2000" b="0" i="1" smtClean="0">
                         <a:solidFill>
                           <a:schemeClr val="tx1"/>
                         </a:solidFill>
@@ -6413,7 +6924,7 @@
                   </m:oMath>
                 </a14:m>
                 <a:r>
-                  <a:rPr lang="es-CO" sz="2400" dirty="0">
+                  <a:rPr lang="es-CO" sz="2000" dirty="0">
                     <a:solidFill>
                       <a:schemeClr val="tx1"/>
                     </a:solidFill>
@@ -6428,7 +6939,7 @@
                       <m:rPr>
                         <m:sty m:val="p"/>
                       </m:rPr>
-                      <a:rPr lang="el-GR" sz="2400" i="1" smtClean="0">
+                      <a:rPr lang="el-GR" sz="2000" i="1" smtClean="0">
                         <a:solidFill>
                           <a:schemeClr val="tx1"/>
                         </a:solidFill>
@@ -6439,7 +6950,7 @@
                       <m:t>τ</m:t>
                     </m:r>
                     <m:r>
-                      <a:rPr lang="en-US" sz="2400" i="1">
+                      <a:rPr lang="en-US" sz="2000" i="1">
                         <a:solidFill>
                           <a:schemeClr val="tx1"/>
                         </a:solidFill>
@@ -6451,7 +6962,7 @@
                     <m:f>
                       <m:fPr>
                         <m:ctrlPr>
-                          <a:rPr lang="en-US" sz="2400" i="1">
+                          <a:rPr lang="en-US" sz="2000" i="1">
                             <a:solidFill>
                               <a:schemeClr val="tx1"/>
                             </a:solidFill>
@@ -6462,7 +6973,7 @@
                       </m:fPr>
                       <m:num>
                         <m:r>
-                          <a:rPr lang="en-US" sz="2400" i="1" smtClean="0">
+                          <a:rPr lang="en-US" sz="2000" i="1" smtClean="0">
                             <a:solidFill>
                               <a:schemeClr val="tx1"/>
                             </a:solidFill>
@@ -6475,7 +6986,7 @@
                       </m:num>
                       <m:den>
                         <m:r>
-                          <a:rPr lang="en-US" sz="2400" i="1">
+                          <a:rPr lang="en-US" sz="2000" i="1">
                             <a:solidFill>
                               <a:schemeClr val="tx1"/>
                             </a:solidFill>
@@ -6486,7 +6997,7 @@
                           <m:t>∆</m:t>
                         </m:r>
                         <m:r>
-                          <a:rPr lang="en-US" sz="2400" i="1">
+                          <a:rPr lang="en-US" sz="2000" i="1">
                             <a:solidFill>
                               <a:schemeClr val="tx1"/>
                             </a:solidFill>
@@ -6501,17 +7012,17 @@
                   </m:oMath>
                 </a14:m>
                 <a:r>
-                  <a:rPr lang="es-CO" sz="2400" dirty="0">
+                  <a:rPr lang="es-CO" sz="2000" dirty="0">
                     <a:solidFill>
                       <a:schemeClr val="tx1"/>
                     </a:solidFill>
                     <a:latin typeface="Calibri Light" panose="020F0302020204030204" pitchFamily="34" charset="0"/>
                     <a:cs typeface="Calibri Light" panose="020F0302020204030204" pitchFamily="34" charset="0"/>
                   </a:rPr>
-                  <a:t> obtenemos la ecuaci</a:t>
+                  <a:t>   obtenemos la ecuaci</a:t>
                 </a:r>
                 <a:r>
-                  <a:rPr lang="en-US" sz="2400" dirty="0">
+                  <a:rPr lang="en-US" sz="2000" dirty="0">
                     <a:solidFill>
                       <a:schemeClr val="tx1"/>
                     </a:solidFill>
@@ -6521,7 +7032,7 @@
                   <a:t>ó</a:t>
                 </a:r>
                 <a:r>
-                  <a:rPr lang="es-CO" sz="2400" dirty="0">
+                  <a:rPr lang="es-CO" sz="2000" dirty="0">
                     <a:solidFill>
                       <a:schemeClr val="tx1"/>
                     </a:solidFill>
@@ -6531,7 +7042,7 @@
                   <a:t>n de </a:t>
                 </a:r>
                 <a:r>
-                  <a:rPr lang="es-CO" sz="2400" dirty="0" err="1">
+                  <a:rPr lang="es-CO" sz="2000" dirty="0" err="1">
                     <a:solidFill>
                       <a:schemeClr val="tx1"/>
                     </a:solidFill>
@@ -6541,7 +7052,7 @@
                   <a:t>Lattice</a:t>
                 </a:r>
                 <a:r>
-                  <a:rPr lang="es-CO" sz="2400" dirty="0">
+                  <a:rPr lang="es-CO" sz="2000" dirty="0">
                     <a:solidFill>
                       <a:schemeClr val="tx1"/>
                     </a:solidFill>
@@ -6551,7 +7062,7 @@
                   <a:t> </a:t>
                 </a:r>
                 <a:r>
-                  <a:rPr lang="es-CO" sz="2400" dirty="0" err="1">
+                  <a:rPr lang="es-CO" sz="2000" dirty="0" err="1">
                     <a:solidFill>
                       <a:schemeClr val="tx1"/>
                     </a:solidFill>
@@ -6561,7 +7072,7 @@
                   <a:t>Boltzmann</a:t>
                 </a:r>
                 <a:r>
-                  <a:rPr lang="es-CO" sz="2400" dirty="0">
+                  <a:rPr lang="es-CO" sz="2000" dirty="0">
                     <a:solidFill>
                       <a:schemeClr val="tx1"/>
                     </a:solidFill>
@@ -6570,8 +7081,13 @@
                   </a:rPr>
                   <a:t> del modelo LBGK:</a:t>
                 </a:r>
+              </a:p>
+              <a:p>
+                <a:pPr marL="45720" indent="0">
+                  <a:buNone/>
+                </a:pPr>
                 <a:br>
-                  <a:rPr lang="es-CO" sz="2400" dirty="0">
+                  <a:rPr lang="es-CO" sz="2000" dirty="0">
                     <a:solidFill>
                       <a:schemeClr val="tx1"/>
                     </a:solidFill>
@@ -6580,7 +7096,7 @@
                   </a:rPr>
                 </a:br>
                 <a:br>
-                  <a:rPr lang="es-CO" dirty="0">
+                  <a:rPr lang="es-CO" sz="2000" dirty="0">
                     <a:solidFill>
                       <a:schemeClr val="tx1"/>
                     </a:solidFill>
@@ -6593,7 +7109,7 @@
                     <m:sSub>
                       <m:sSubPr>
                         <m:ctrlPr>
-                          <a:rPr lang="en-US" sz="2400" i="1">
+                          <a:rPr lang="en-US" i="1">
                             <a:solidFill>
                               <a:schemeClr val="tx1"/>
                             </a:solidFill>
@@ -6605,7 +7121,7 @@
                       </m:sSubPr>
                       <m:e>
                         <m:r>
-                          <a:rPr lang="en-US" sz="2400" i="1">
+                          <a:rPr lang="en-US" i="1">
                             <a:solidFill>
                               <a:schemeClr val="tx1"/>
                             </a:solidFill>
@@ -6617,7 +7133,7 @@
                       </m:e>
                       <m:sub>
                         <m:r>
-                          <a:rPr lang="en-US" sz="2400" i="1">
+                          <a:rPr lang="en-US" i="1">
                             <a:solidFill>
                               <a:schemeClr val="tx1"/>
                             </a:solidFill>
@@ -6632,7 +7148,7 @@
                     <m:d>
                       <m:dPr>
                         <m:ctrlPr>
-                          <a:rPr lang="en-US" sz="2400" b="0" i="1" smtClean="0">
+                          <a:rPr lang="en-US" b="0" i="1" smtClean="0">
                             <a:solidFill>
                               <a:schemeClr val="tx1"/>
                             </a:solidFill>
@@ -6647,7 +7163,7 @@
                           <m:accPr>
                             <m:chr m:val="⃗"/>
                             <m:ctrlPr>
-                              <a:rPr lang="en-US" sz="2400" b="0" i="1" smtClean="0">
+                              <a:rPr lang="en-US" b="0" i="1" smtClean="0">
                                 <a:solidFill>
                                   <a:schemeClr val="tx1"/>
                                 </a:solidFill>
@@ -6659,7 +7175,7 @@
                           </m:accPr>
                           <m:e>
                             <m:r>
-                              <a:rPr lang="en-US" sz="2400" i="1" smtClean="0">
+                              <a:rPr lang="en-US" i="1" smtClean="0">
                                 <a:solidFill>
                                   <a:schemeClr val="tx1"/>
                                 </a:solidFill>
@@ -6672,7 +7188,7 @@
                           </m:e>
                         </m:acc>
                         <m:r>
-                          <a:rPr lang="en-US" sz="2400" b="0" i="1" smtClean="0">
+                          <a:rPr lang="en-US" b="0" i="1" smtClean="0">
                             <a:solidFill>
                               <a:schemeClr val="tx1"/>
                             </a:solidFill>
@@ -6686,7 +7202,7 @@
                           <m:accPr>
                             <m:chr m:val="⃗"/>
                             <m:ctrlPr>
-                              <a:rPr lang="en-US" sz="2400" b="0" i="1" smtClean="0">
+                              <a:rPr lang="en-US" b="0" i="1" smtClean="0">
                                 <a:solidFill>
                                   <a:schemeClr val="tx1"/>
                                 </a:solidFill>
@@ -6700,7 +7216,7 @@
                             <m:sSub>
                               <m:sSubPr>
                                 <m:ctrlPr>
-                                  <a:rPr lang="en-US" sz="2400" i="1">
+                                  <a:rPr lang="en-US" i="1">
                                     <a:solidFill>
                                       <a:schemeClr val="tx1"/>
                                     </a:solidFill>
@@ -6712,7 +7228,7 @@
                               </m:sSubPr>
                               <m:e>
                                 <m:r>
-                                  <a:rPr lang="en-US" sz="2400" b="0" i="1" smtClean="0">
+                                  <a:rPr lang="en-US" b="0" i="1" smtClean="0">
                                     <a:solidFill>
                                       <a:schemeClr val="tx1"/>
                                     </a:solidFill>
@@ -6725,7 +7241,7 @@
                               </m:e>
                               <m:sub>
                                 <m:r>
-                                  <a:rPr lang="en-US" sz="2400" i="1">
+                                  <a:rPr lang="en-US" i="1">
                                     <a:solidFill>
                                       <a:schemeClr val="tx1"/>
                                     </a:solidFill>
@@ -6740,7 +7256,7 @@
                           </m:e>
                         </m:acc>
                         <m:r>
-                          <a:rPr lang="en-US" sz="2400" b="0" i="1" smtClean="0">
+                          <a:rPr lang="en-US" b="0" i="1" smtClean="0">
                             <a:solidFill>
                               <a:schemeClr val="tx1"/>
                             </a:solidFill>
@@ -6751,7 +7267,7 @@
                           <m:t>,  </m:t>
                         </m:r>
                         <m:r>
-                          <a:rPr lang="en-US" sz="2400" b="0" i="1" smtClean="0">
+                          <a:rPr lang="en-US" b="0" i="1" smtClean="0">
                             <a:solidFill>
                               <a:schemeClr val="tx1"/>
                             </a:solidFill>
@@ -6762,7 +7278,7 @@
                           <m:t>𝑡</m:t>
                         </m:r>
                         <m:r>
-                          <a:rPr lang="en-US" sz="2400" b="0" i="1" smtClean="0">
+                          <a:rPr lang="en-US" b="0" i="1" smtClean="0">
                             <a:solidFill>
                               <a:schemeClr val="tx1"/>
                             </a:solidFill>
@@ -6775,7 +7291,7 @@
                       </m:e>
                     </m:d>
                     <m:r>
-                      <a:rPr lang="en-US" sz="2400" b="0" i="1" smtClean="0">
+                      <a:rPr lang="en-US" b="0" i="1" smtClean="0">
                         <a:solidFill>
                           <a:schemeClr val="tx1"/>
                         </a:solidFill>
@@ -6788,7 +7304,7 @@
                     <m:sSub>
                       <m:sSubPr>
                         <m:ctrlPr>
-                          <a:rPr lang="en-US" sz="2400" i="1">
+                          <a:rPr lang="en-US" i="1">
                             <a:solidFill>
                               <a:schemeClr val="tx1"/>
                             </a:solidFill>
@@ -6800,7 +7316,7 @@
                       </m:sSubPr>
                       <m:e>
                         <m:r>
-                          <a:rPr lang="en-US" sz="2400" i="1">
+                          <a:rPr lang="en-US" i="1">
                             <a:solidFill>
                               <a:schemeClr val="tx1"/>
                             </a:solidFill>
@@ -6812,7 +7328,7 @@
                       </m:e>
                       <m:sub>
                         <m:r>
-                          <a:rPr lang="en-US" sz="2400" i="1">
+                          <a:rPr lang="en-US" i="1">
                             <a:solidFill>
                               <a:schemeClr val="tx1"/>
                             </a:solidFill>
@@ -6827,7 +7343,7 @@
                     <m:d>
                       <m:dPr>
                         <m:ctrlPr>
-                          <a:rPr lang="en-US" sz="2400" i="1">
+                          <a:rPr lang="en-US" i="1">
                             <a:solidFill>
                               <a:schemeClr val="tx1"/>
                             </a:solidFill>
@@ -6842,7 +7358,7 @@
                           <m:accPr>
                             <m:chr m:val="⃗"/>
                             <m:ctrlPr>
-                              <a:rPr lang="en-US" sz="2400" i="1">
+                              <a:rPr lang="en-US" i="1">
                                 <a:solidFill>
                                   <a:schemeClr val="tx1"/>
                                 </a:solidFill>
@@ -6854,7 +7370,7 @@
                           </m:accPr>
                           <m:e>
                             <m:r>
-                              <a:rPr lang="en-US" sz="2400" i="1">
+                              <a:rPr lang="en-US" i="1">
                                 <a:solidFill>
                                   <a:schemeClr val="tx1"/>
                                 </a:solidFill>
@@ -6867,7 +7383,7 @@
                           </m:e>
                         </m:acc>
                         <m:r>
-                          <a:rPr lang="en-US" sz="2400" b="0" i="1" smtClean="0">
+                          <a:rPr lang="en-US" b="0" i="1" smtClean="0">
                             <a:solidFill>
                               <a:schemeClr val="tx1"/>
                             </a:solidFill>
@@ -6878,7 +7394,7 @@
                           <m:t>,</m:t>
                         </m:r>
                         <m:r>
-                          <a:rPr lang="en-US" sz="2400" i="1">
+                          <a:rPr lang="en-US" i="1">
                             <a:solidFill>
                               <a:schemeClr val="tx1"/>
                             </a:solidFill>
@@ -6891,7 +7407,7 @@
                       </m:e>
                     </m:d>
                     <m:r>
-                      <a:rPr lang="en-US" sz="2400" i="1">
+                      <a:rPr lang="en-US" i="1">
                         <a:solidFill>
                           <a:schemeClr val="tx1"/>
                         </a:solidFill>
@@ -6904,7 +7420,7 @@
                     <m:f>
                       <m:fPr>
                         <m:ctrlPr>
-                          <a:rPr lang="en-US" sz="2400" b="0" i="1" smtClean="0">
+                          <a:rPr lang="en-US" b="0" i="1" smtClean="0">
                             <a:solidFill>
                               <a:schemeClr val="tx1"/>
                             </a:solidFill>
@@ -6916,7 +7432,7 @@
                       </m:fPr>
                       <m:num>
                         <m:r>
-                          <a:rPr lang="en-US" sz="2400" b="0" i="1" smtClean="0">
+                          <a:rPr lang="en-US" b="0" i="1" smtClean="0">
                             <a:solidFill>
                               <a:schemeClr val="tx1"/>
                             </a:solidFill>
@@ -6929,7 +7445,7 @@
                       </m:num>
                       <m:den>
                         <m:r>
-                          <a:rPr lang="en-US" sz="2400" b="0" i="1" smtClean="0">
+                          <a:rPr lang="en-US" b="0" i="1" smtClean="0">
                             <a:solidFill>
                               <a:schemeClr val="tx1"/>
                             </a:solidFill>
@@ -6942,7 +7458,7 @@
                       </m:den>
                     </m:f>
                     <m:r>
-                      <a:rPr lang="en-US" sz="2400" b="0" i="1" smtClean="0">
+                      <a:rPr lang="en-US" b="0" i="1" smtClean="0">
                         <a:solidFill>
                           <a:schemeClr val="tx1"/>
                         </a:solidFill>
@@ -6955,7 +7471,7 @@
                     <m:sSub>
                       <m:sSubPr>
                         <m:ctrlPr>
-                          <a:rPr lang="en-US" sz="2400" i="1">
+                          <a:rPr lang="en-US" i="1">
                             <a:solidFill>
                               <a:schemeClr val="tx1"/>
                             </a:solidFill>
@@ -6967,7 +7483,7 @@
                       </m:sSubPr>
                       <m:e>
                         <m:r>
-                          <a:rPr lang="en-US" sz="2400" i="1">
+                          <a:rPr lang="en-US" i="1">
                             <a:solidFill>
                               <a:schemeClr val="tx1"/>
                             </a:solidFill>
@@ -6980,7 +7496,7 @@
                       </m:e>
                       <m:sub>
                         <m:r>
-                          <a:rPr lang="en-US" sz="2400" i="1">
+                          <a:rPr lang="en-US" i="1">
                             <a:solidFill>
                               <a:schemeClr val="tx1"/>
                             </a:solidFill>
@@ -6995,7 +7511,7 @@
                     <m:d>
                       <m:dPr>
                         <m:ctrlPr>
-                          <a:rPr lang="en-US" sz="2400" i="1">
+                          <a:rPr lang="en-US" i="1">
                             <a:solidFill>
                               <a:schemeClr val="tx1"/>
                             </a:solidFill>
@@ -7010,7 +7526,7 @@
                           <m:accPr>
                             <m:chr m:val="⃗"/>
                             <m:ctrlPr>
-                              <a:rPr lang="en-US" sz="2400" i="1">
+                              <a:rPr lang="en-US" i="1">
                                 <a:solidFill>
                                   <a:schemeClr val="tx1"/>
                                 </a:solidFill>
@@ -7022,7 +7538,7 @@
                           </m:accPr>
                           <m:e>
                             <m:r>
-                              <a:rPr lang="en-US" sz="2400" i="1">
+                              <a:rPr lang="en-US" i="1">
                                 <a:solidFill>
                                   <a:schemeClr val="tx1"/>
                                 </a:solidFill>
@@ -7035,7 +7551,7 @@
                           </m:e>
                         </m:acc>
                         <m:r>
-                          <a:rPr lang="en-US" sz="2400" i="1">
+                          <a:rPr lang="en-US" i="1">
                             <a:solidFill>
                               <a:schemeClr val="tx1"/>
                             </a:solidFill>
@@ -7046,7 +7562,7 @@
                           <m:t>,</m:t>
                         </m:r>
                         <m:r>
-                          <a:rPr lang="en-US" sz="2400" i="1">
+                          <a:rPr lang="en-US" i="1">
                             <a:solidFill>
                               <a:schemeClr val="tx1"/>
                             </a:solidFill>
@@ -7059,7 +7575,7 @@
                       </m:e>
                     </m:d>
                     <m:r>
-                      <a:rPr lang="en-US" sz="2400" b="0" i="1" smtClean="0">
+                      <a:rPr lang="en-US" b="0" i="1" smtClean="0">
                         <a:solidFill>
                           <a:schemeClr val="tx1"/>
                         </a:solidFill>
@@ -7072,7 +7588,7 @@
                     <m:sSup>
                       <m:sSupPr>
                         <m:ctrlPr>
-                          <a:rPr lang="en-US" sz="2400" b="0" i="1" smtClean="0">
+                          <a:rPr lang="en-US" b="0" i="1" smtClean="0">
                             <a:solidFill>
                               <a:schemeClr val="tx1"/>
                             </a:solidFill>
@@ -7086,7 +7602,7 @@
                         <m:sSub>
                           <m:sSubPr>
                             <m:ctrlPr>
-                              <a:rPr lang="en-US" sz="2400" i="1">
+                              <a:rPr lang="en-US" i="1">
                                 <a:solidFill>
                                   <a:schemeClr val="tx1"/>
                                 </a:solidFill>
@@ -7098,7 +7614,7 @@
                           </m:sSubPr>
                           <m:e>
                             <m:r>
-                              <a:rPr lang="en-US" sz="2400" i="1">
+                              <a:rPr lang="en-US" i="1">
                                 <a:solidFill>
                                   <a:schemeClr val="tx1"/>
                                 </a:solidFill>
@@ -7111,7 +7627,7 @@
                           </m:e>
                           <m:sub>
                             <m:r>
-                              <a:rPr lang="en-US" sz="2400" i="1">
+                              <a:rPr lang="en-US" i="1">
                                 <a:solidFill>
                                   <a:schemeClr val="tx1"/>
                                 </a:solidFill>
@@ -7126,7 +7642,7 @@
                       </m:e>
                       <m:sup>
                         <m:r>
-                          <a:rPr lang="en-US" sz="2400" b="0" i="1" smtClean="0">
+                          <a:rPr lang="en-US" b="0" i="1" smtClean="0">
                             <a:solidFill>
                               <a:schemeClr val="tx1"/>
                             </a:solidFill>
@@ -7137,7 +7653,7 @@
                           <m:t>(</m:t>
                         </m:r>
                         <m:r>
-                          <a:rPr lang="en-US" sz="2400" b="0" i="1" smtClean="0">
+                          <a:rPr lang="en-US" b="0" i="1" smtClean="0">
                             <a:solidFill>
                               <a:schemeClr val="tx1"/>
                             </a:solidFill>
@@ -7148,7 +7664,7 @@
                           <m:t>𝑒𝑞</m:t>
                         </m:r>
                         <m:r>
-                          <a:rPr lang="en-US" sz="2400" b="0" i="1" smtClean="0">
+                          <a:rPr lang="en-US" b="0" i="1" smtClean="0">
                             <a:solidFill>
                               <a:schemeClr val="tx1"/>
                             </a:solidFill>
@@ -7163,7 +7679,7 @@
                     <m:d>
                       <m:dPr>
                         <m:ctrlPr>
-                          <a:rPr lang="en-US" sz="2400" i="1">
+                          <a:rPr lang="en-US" i="1">
                             <a:solidFill>
                               <a:schemeClr val="tx1"/>
                             </a:solidFill>
@@ -7178,7 +7694,7 @@
                           <m:accPr>
                             <m:chr m:val="⃗"/>
                             <m:ctrlPr>
-                              <a:rPr lang="en-US" sz="2400" i="1">
+                              <a:rPr lang="en-US" i="1">
                                 <a:solidFill>
                                   <a:schemeClr val="tx1"/>
                                 </a:solidFill>
@@ -7190,7 +7706,7 @@
                           </m:accPr>
                           <m:e>
                             <m:r>
-                              <a:rPr lang="en-US" sz="2400" i="1">
+                              <a:rPr lang="en-US" i="1">
                                 <a:solidFill>
                                   <a:schemeClr val="tx1"/>
                                 </a:solidFill>
@@ -7203,7 +7719,7 @@
                           </m:e>
                         </m:acc>
                         <m:r>
-                          <a:rPr lang="en-US" sz="2400" i="1">
+                          <a:rPr lang="en-US" i="1">
                             <a:solidFill>
                               <a:schemeClr val="tx1"/>
                             </a:solidFill>
@@ -7214,7 +7730,7 @@
                           <m:t>,</m:t>
                         </m:r>
                         <m:r>
-                          <a:rPr lang="en-US" sz="2400" i="1">
+                          <a:rPr lang="en-US" i="1">
                             <a:solidFill>
                               <a:schemeClr val="tx1"/>
                             </a:solidFill>
@@ -7227,7 +7743,7 @@
                       </m:e>
                     </m:d>
                     <m:r>
-                      <a:rPr lang="en-US" sz="2400" b="0" i="1" smtClean="0">
+                      <a:rPr lang="en-US" b="0" i="1" smtClean="0">
                         <a:solidFill>
                           <a:schemeClr val="tx1"/>
                         </a:solidFill>
@@ -7240,7 +7756,7 @@
                   </m:oMath>
                 </a14:m>
                 <a:r>
-                  <a:rPr lang="es-CO" sz="2400" dirty="0">
+                  <a:rPr lang="es-CO" dirty="0">
                     <a:solidFill>
                       <a:schemeClr val="tx1"/>
                     </a:solidFill>
@@ -7249,8 +7765,13 @@
                   </a:rPr>
                   <a:t> </a:t>
                 </a:r>
+              </a:p>
+              <a:p>
+                <a:pPr marL="45720" indent="0">
+                  <a:buNone/>
+                </a:pPr>
                 <a:br>
-                  <a:rPr lang="es-CO" sz="2400" dirty="0">
+                  <a:rPr lang="es-CO" sz="2000" dirty="0">
                     <a:solidFill>
                       <a:schemeClr val="tx1"/>
                     </a:solidFill>
@@ -7259,7 +7780,7 @@
                   </a:rPr>
                 </a:br>
                 <a:br>
-                  <a:rPr lang="es-CO" sz="2400" dirty="0">
+                  <a:rPr lang="es-CO" sz="2000" dirty="0">
                     <a:solidFill>
                       <a:schemeClr val="tx1"/>
                     </a:solidFill>
@@ -7268,7 +7789,7 @@
                   </a:rPr>
                 </a:br>
                 <a:r>
-                  <a:rPr lang="en-US" sz="2400" dirty="0" err="1">
+                  <a:rPr lang="en-US" sz="2000" dirty="0" err="1">
                     <a:solidFill>
                       <a:schemeClr val="tx1"/>
                     </a:solidFill>
@@ -7277,7 +7798,19 @@
                   </a:rPr>
                   <a:t>donde</a:t>
                 </a:r>
-                <a:endParaRPr lang="es-CO" sz="2400" dirty="0">
+                <a:endParaRPr lang="en-US" sz="2000" dirty="0">
+                  <a:solidFill>
+                    <a:schemeClr val="tx1"/>
+                  </a:solidFill>
+                  <a:latin typeface="Calibri Light" panose="020F0302020204030204" pitchFamily="34" charset="0"/>
+                  <a:cs typeface="Calibri Light" panose="020F0302020204030204" pitchFamily="34" charset="0"/>
+                </a:endParaRPr>
+              </a:p>
+              <a:p>
+                <a:pPr marL="45720" indent="0">
+                  <a:buNone/>
+                </a:pPr>
+                <a:endParaRPr lang="es-CO" sz="2000" dirty="0">
                   <a:solidFill>
                     <a:schemeClr val="tx1"/>
                   </a:solidFill>
@@ -7294,7 +7827,7 @@
                     <m:sSup>
                       <m:sSupPr>
                         <m:ctrlPr>
-                          <a:rPr lang="en-US" sz="2600" i="1">
+                          <a:rPr lang="en-US" i="1">
                             <a:solidFill>
                               <a:schemeClr val="tx1"/>
                             </a:solidFill>
@@ -7308,7 +7841,7 @@
                         <m:sSub>
                           <m:sSubPr>
                             <m:ctrlPr>
-                              <a:rPr lang="en-US" sz="2600" i="1">
+                              <a:rPr lang="en-US" i="1">
                                 <a:solidFill>
                                   <a:schemeClr val="tx1"/>
                                 </a:solidFill>
@@ -7320,7 +7853,7 @@
                           </m:sSubPr>
                           <m:e>
                             <m:r>
-                              <a:rPr lang="en-US" sz="2600" i="1">
+                              <a:rPr lang="en-US" i="1">
                                 <a:solidFill>
                                   <a:schemeClr val="tx1"/>
                                 </a:solidFill>
@@ -7333,7 +7866,7 @@
                           </m:e>
                           <m:sub>
                             <m:r>
-                              <a:rPr lang="en-US" sz="2600" i="1">
+                              <a:rPr lang="en-US" i="1">
                                 <a:solidFill>
                                   <a:schemeClr val="tx1"/>
                                 </a:solidFill>
@@ -7348,7 +7881,7 @@
                       </m:e>
                       <m:sup>
                         <m:r>
-                          <a:rPr lang="en-US" sz="2600" i="1">
+                          <a:rPr lang="en-US" i="1">
                             <a:solidFill>
                               <a:schemeClr val="tx1"/>
                             </a:solidFill>
@@ -7359,7 +7892,7 @@
                           <m:t>(</m:t>
                         </m:r>
                         <m:r>
-                          <a:rPr lang="en-US" sz="2600" i="1">
+                          <a:rPr lang="en-US" i="1">
                             <a:solidFill>
                               <a:schemeClr val="tx1"/>
                             </a:solidFill>
@@ -7370,7 +7903,7 @@
                           <m:t>𝑒𝑞</m:t>
                         </m:r>
                         <m:r>
-                          <a:rPr lang="en-US" sz="2600" i="1">
+                          <a:rPr lang="en-US" i="1">
                             <a:solidFill>
                               <a:schemeClr val="tx1"/>
                             </a:solidFill>
@@ -7383,7 +7916,7 @@
                       </m:sup>
                     </m:sSup>
                     <m:r>
-                      <a:rPr lang="en-US" sz="2600" b="0" i="1" smtClean="0">
+                      <a:rPr lang="en-US" b="0" i="1" smtClean="0">
                         <a:solidFill>
                           <a:schemeClr val="tx1"/>
                         </a:solidFill>
@@ -7396,7 +7929,7 @@
                     <m:sSub>
                       <m:sSubPr>
                         <m:ctrlPr>
-                          <a:rPr lang="en-US" sz="2600" b="0" i="1" smtClean="0">
+                          <a:rPr lang="en-US" b="0" i="1" smtClean="0">
                             <a:solidFill>
                               <a:schemeClr val="tx1"/>
                             </a:solidFill>
@@ -7408,7 +7941,7 @@
                       </m:sSubPr>
                       <m:e>
                         <m:r>
-                          <a:rPr lang="en-US" sz="2600" b="0" i="1" smtClean="0">
+                          <a:rPr lang="en-US" b="0" i="1" smtClean="0">
                             <a:solidFill>
                               <a:schemeClr val="tx1"/>
                             </a:solidFill>
@@ -7421,7 +7954,7 @@
                       </m:e>
                       <m:sub>
                         <m:r>
-                          <a:rPr lang="en-US" sz="2600" b="0" i="1" smtClean="0">
+                          <a:rPr lang="en-US" b="0" i="1" smtClean="0">
                             <a:solidFill>
                               <a:schemeClr val="tx1"/>
                             </a:solidFill>
@@ -7434,7 +7967,7 @@
                       </m:sub>
                     </m:sSub>
                     <m:r>
-                      <a:rPr lang="en-US" sz="2600" b="0" i="1" smtClean="0">
+                      <a:rPr lang="en-US" b="0" i="1" smtClean="0">
                         <a:solidFill>
                           <a:schemeClr val="tx1"/>
                         </a:solidFill>
@@ -7445,7 +7978,7 @@
                       <m:t>𝜌</m:t>
                     </m:r>
                     <m:r>
-                      <a:rPr lang="en-US" sz="2600" b="0" i="1" smtClean="0">
+                      <a:rPr lang="en-US" b="0" i="1" smtClean="0">
                         <a:solidFill>
                           <a:schemeClr val="tx1"/>
                         </a:solidFill>
@@ -7458,7 +7991,7 @@
                     <m:f>
                       <m:fPr>
                         <m:ctrlPr>
-                          <a:rPr lang="en-US" sz="2600" b="0" i="1" smtClean="0">
+                          <a:rPr lang="en-US" b="0" i="1" smtClean="0">
                             <a:solidFill>
                               <a:schemeClr val="tx1"/>
                             </a:solidFill>
@@ -7473,7 +8006,7 @@
                           <m:accPr>
                             <m:chr m:val="⃗"/>
                             <m:ctrlPr>
-                              <a:rPr lang="es-CO" sz="2600" b="0" i="1" smtClean="0">
+                              <a:rPr lang="es-CO" b="0" i="1" smtClean="0">
                                 <a:solidFill>
                                   <a:schemeClr val="tx1"/>
                                 </a:solidFill>
@@ -7487,7 +8020,7 @@
                             <m:sSub>
                               <m:sSubPr>
                                 <m:ctrlPr>
-                                  <a:rPr lang="en-US" sz="2600" b="0" i="1" smtClean="0">
+                                  <a:rPr lang="en-US" b="0" i="1" smtClean="0">
                                     <a:solidFill>
                                       <a:schemeClr val="tx1"/>
                                     </a:solidFill>
@@ -7499,7 +8032,7 @@
                               </m:sSubPr>
                               <m:e>
                                 <m:r>
-                                  <a:rPr lang="en-US" sz="2600" b="0" i="1" smtClean="0">
+                                  <a:rPr lang="en-US" b="0" i="1" smtClean="0">
                                     <a:solidFill>
                                       <a:schemeClr val="tx1"/>
                                     </a:solidFill>
@@ -7512,7 +8045,7 @@
                               </m:e>
                               <m:sub>
                                 <m:r>
-                                  <a:rPr lang="en-US" sz="2600" b="0" i="1" smtClean="0">
+                                  <a:rPr lang="en-US" b="0" i="1" smtClean="0">
                                     <a:solidFill>
                                       <a:schemeClr val="tx1"/>
                                     </a:solidFill>
@@ -7527,7 +8060,7 @@
                           </m:e>
                         </m:acc>
                         <m:r>
-                          <a:rPr lang="en-US" sz="2600" i="1">
+                          <a:rPr lang="en-US" i="1">
                             <a:solidFill>
                               <a:schemeClr val="tx1"/>
                             </a:solidFill>
@@ -7541,7 +8074,7 @@
                           <m:accPr>
                             <m:chr m:val="⃗"/>
                             <m:ctrlPr>
-                              <a:rPr lang="en-US" sz="2600" i="1">
+                              <a:rPr lang="en-US" i="1">
                                 <a:solidFill>
                                   <a:schemeClr val="tx1"/>
                                 </a:solidFill>
@@ -7553,7 +8086,7 @@
                           </m:accPr>
                           <m:e>
                             <m:r>
-                              <a:rPr lang="en-US" sz="2600" i="1">
+                              <a:rPr lang="en-US" i="1">
                                 <a:solidFill>
                                   <a:schemeClr val="tx1"/>
                                 </a:solidFill>
@@ -7570,7 +8103,7 @@
                         <m:sSup>
                           <m:sSupPr>
                             <m:ctrlPr>
-                              <a:rPr lang="en-US" sz="2600" b="0" i="1" smtClean="0">
+                              <a:rPr lang="en-US" b="0" i="1" smtClean="0">
                                 <a:solidFill>
                                   <a:schemeClr val="tx1"/>
                                 </a:solidFill>
@@ -7582,7 +8115,7 @@
                           </m:sSupPr>
                           <m:e>
                             <m:r>
-                              <a:rPr lang="en-US" sz="2600" b="0" i="1" smtClean="0">
+                              <a:rPr lang="en-US" b="0" i="1" smtClean="0">
                                 <a:solidFill>
                                   <a:schemeClr val="tx1"/>
                                 </a:solidFill>
@@ -7595,7 +8128,7 @@
                           </m:e>
                           <m:sup>
                             <m:r>
-                              <a:rPr lang="en-US" sz="2600" b="0" i="1" smtClean="0">
+                              <a:rPr lang="en-US" b="0" i="1" smtClean="0">
                                 <a:solidFill>
                                   <a:schemeClr val="tx1"/>
                                 </a:solidFill>
@@ -7610,7 +8143,7 @@
                       </m:den>
                     </m:f>
                     <m:r>
-                      <a:rPr lang="en-US" sz="2600" b="0" i="1" smtClean="0">
+                      <a:rPr lang="en-US" b="0" i="1" smtClean="0">
                         <a:solidFill>
                           <a:schemeClr val="tx1"/>
                         </a:solidFill>
@@ -7623,7 +8156,7 @@
                     <m:f>
                       <m:fPr>
                         <m:ctrlPr>
-                          <a:rPr lang="en-US" sz="2600" b="0" i="1" smtClean="0">
+                          <a:rPr lang="en-US" b="0" i="1" smtClean="0">
                             <a:solidFill>
                               <a:schemeClr val="tx1"/>
                             </a:solidFill>
@@ -7635,7 +8168,7 @@
                       </m:fPr>
                       <m:num>
                         <m:r>
-                          <a:rPr lang="en-US" sz="2600" b="0" i="1" smtClean="0">
+                          <a:rPr lang="en-US" b="0" i="1" smtClean="0">
                             <a:solidFill>
                               <a:schemeClr val="tx1"/>
                             </a:solidFill>
@@ -7648,7 +8181,7 @@
                         <m:sSup>
                           <m:sSupPr>
                             <m:ctrlPr>
-                              <a:rPr lang="en-US" sz="2600" b="0" i="1" smtClean="0">
+                              <a:rPr lang="en-US" b="0" i="1" smtClean="0">
                                 <a:solidFill>
                                   <a:schemeClr val="tx1"/>
                                 </a:solidFill>
@@ -7662,7 +8195,7 @@
                             <m:d>
                               <m:dPr>
                                 <m:ctrlPr>
-                                  <a:rPr lang="en-US" sz="2600" i="1">
+                                  <a:rPr lang="en-US" i="1">
                                     <a:solidFill>
                                       <a:schemeClr val="tx1"/>
                                     </a:solidFill>
@@ -7677,7 +8210,7 @@
                                   <m:accPr>
                                     <m:chr m:val="⃗"/>
                                     <m:ctrlPr>
-                                      <a:rPr lang="es-CO" sz="2600" b="0" i="1" smtClean="0">
+                                      <a:rPr lang="es-CO" b="0" i="1" smtClean="0">
                                         <a:solidFill>
                                           <a:schemeClr val="tx1"/>
                                         </a:solidFill>
@@ -7691,7 +8224,7 @@
                                     <m:sSub>
                                       <m:sSubPr>
                                         <m:ctrlPr>
-                                          <a:rPr lang="en-US" sz="2600" i="1">
+                                          <a:rPr lang="en-US" i="1">
                                             <a:solidFill>
                                               <a:schemeClr val="tx1"/>
                                             </a:solidFill>
@@ -7703,7 +8236,7 @@
                                       </m:sSubPr>
                                       <m:e>
                                         <m:r>
-                                          <a:rPr lang="en-US" sz="2600" i="1">
+                                          <a:rPr lang="en-US" i="1">
                                             <a:solidFill>
                                               <a:schemeClr val="tx1"/>
                                             </a:solidFill>
@@ -7716,7 +8249,7 @@
                                       </m:e>
                                       <m:sub>
                                         <m:r>
-                                          <a:rPr lang="en-US" sz="2600" i="1">
+                                          <a:rPr lang="en-US" i="1">
                                             <a:solidFill>
                                               <a:schemeClr val="tx1"/>
                                             </a:solidFill>
@@ -7731,7 +8264,7 @@
                                   </m:e>
                                 </m:acc>
                                 <m:r>
-                                  <a:rPr lang="en-US" sz="2600" i="1">
+                                  <a:rPr lang="en-US" i="1">
                                     <a:solidFill>
                                       <a:schemeClr val="tx1"/>
                                     </a:solidFill>
@@ -7745,7 +8278,7 @@
                                   <m:accPr>
                                     <m:chr m:val="⃗"/>
                                     <m:ctrlPr>
-                                      <a:rPr lang="en-US" sz="2600" i="1">
+                                      <a:rPr lang="en-US" i="1">
                                         <a:solidFill>
                                           <a:schemeClr val="tx1"/>
                                         </a:solidFill>
@@ -7757,7 +8290,7 @@
                                   </m:accPr>
                                   <m:e>
                                     <m:r>
-                                      <a:rPr lang="en-US" sz="2600" i="1">
+                                      <a:rPr lang="en-US" i="1">
                                         <a:solidFill>
                                           <a:schemeClr val="tx1"/>
                                         </a:solidFill>
@@ -7774,7 +8307,7 @@
                           </m:e>
                           <m:sup>
                             <m:r>
-                              <a:rPr lang="en-US" sz="2600" b="0" i="1" smtClean="0">
+                              <a:rPr lang="en-US" b="0" i="1" smtClean="0">
                                 <a:solidFill>
                                   <a:schemeClr val="tx1"/>
                                 </a:solidFill>
@@ -7789,7 +8322,7 @@
                       </m:num>
                       <m:den>
                         <m:r>
-                          <a:rPr lang="en-US" sz="2600" b="0" i="1" smtClean="0">
+                          <a:rPr lang="en-US" b="0" i="1" smtClean="0">
                             <a:solidFill>
                               <a:schemeClr val="tx1"/>
                             </a:solidFill>
@@ -7802,7 +8335,7 @@
                         <m:sSup>
                           <m:sSupPr>
                             <m:ctrlPr>
-                              <a:rPr lang="en-US" sz="2600" b="0" i="1" smtClean="0">
+                              <a:rPr lang="en-US" b="0" i="1" smtClean="0">
                                 <a:solidFill>
                                   <a:schemeClr val="tx1"/>
                                 </a:solidFill>
@@ -7814,7 +8347,7 @@
                           </m:sSupPr>
                           <m:e>
                             <m:r>
-                              <a:rPr lang="en-US" sz="2600" b="0" i="1" smtClean="0">
+                              <a:rPr lang="en-US" b="0" i="1" smtClean="0">
                                 <a:solidFill>
                                   <a:schemeClr val="tx1"/>
                                 </a:solidFill>
@@ -7827,7 +8360,7 @@
                           </m:e>
                           <m:sup>
                             <m:r>
-                              <a:rPr lang="en-US" sz="2600" b="0" i="1" smtClean="0">
+                              <a:rPr lang="en-US" b="0" i="1" smtClean="0">
                                 <a:solidFill>
                                   <a:schemeClr val="tx1"/>
                                 </a:solidFill>
@@ -7842,7 +8375,7 @@
                       </m:den>
                     </m:f>
                     <m:r>
-                      <a:rPr lang="en-US" sz="2600" b="0" i="1" smtClean="0">
+                      <a:rPr lang="en-US" b="0" i="1" smtClean="0">
                         <a:solidFill>
                           <a:schemeClr val="tx1"/>
                         </a:solidFill>
@@ -7855,7 +8388,7 @@
                     <m:f>
                       <m:fPr>
                         <m:ctrlPr>
-                          <a:rPr lang="en-US" sz="2600" b="0" i="1" smtClean="0">
+                          <a:rPr lang="en-US" b="0" i="1" smtClean="0">
                             <a:solidFill>
                               <a:schemeClr val="tx1"/>
                             </a:solidFill>
@@ -7867,7 +8400,7 @@
                       </m:fPr>
                       <m:num>
                         <m:r>
-                          <a:rPr lang="en-US" sz="2600" b="0" i="1" smtClean="0">
+                          <a:rPr lang="en-US" b="0" i="1" smtClean="0">
                             <a:solidFill>
                               <a:schemeClr val="tx1"/>
                             </a:solidFill>
@@ -7880,7 +8413,7 @@
                         <m:sSup>
                           <m:sSupPr>
                             <m:ctrlPr>
-                              <a:rPr lang="en-US" sz="2600" b="0" i="1" smtClean="0">
+                              <a:rPr lang="en-US" b="0" i="1" smtClean="0">
                                 <a:solidFill>
                                   <a:schemeClr val="tx1"/>
                                 </a:solidFill>
@@ -7892,7 +8425,7 @@
                           </m:sSupPr>
                           <m:e>
                             <m:r>
-                              <a:rPr lang="es-CO" sz="2600" b="0" i="1" smtClean="0">
+                              <a:rPr lang="es-CO" b="0" i="1" smtClean="0">
                                 <a:solidFill>
                                   <a:schemeClr val="tx1"/>
                                 </a:solidFill>
@@ -7906,7 +8439,7 @@
                               <m:accPr>
                                 <m:chr m:val="⃗"/>
                                 <m:ctrlPr>
-                                  <a:rPr lang="es-CO" sz="2600" b="0" i="1" smtClean="0">
+                                  <a:rPr lang="es-CO" b="0" i="1" smtClean="0">
                                     <a:solidFill>
                                       <a:schemeClr val="tx1"/>
                                     </a:solidFill>
@@ -7918,7 +8451,7 @@
                               </m:accPr>
                               <m:e>
                                 <m:r>
-                                  <a:rPr lang="en-US" sz="2600" b="0" i="1" smtClean="0">
+                                  <a:rPr lang="en-US" b="0" i="1" smtClean="0">
                                     <a:solidFill>
                                       <a:schemeClr val="tx1"/>
                                     </a:solidFill>
@@ -7931,7 +8464,7 @@
                               </m:e>
                             </m:acc>
                             <m:r>
-                              <a:rPr lang="es-CO" sz="2400" b="0" i="1" dirty="0" smtClean="0">
+                              <a:rPr lang="es-CO" b="0" i="1" dirty="0" smtClean="0">
                                 <a:solidFill>
                                   <a:schemeClr val="tx1"/>
                                 </a:solidFill>
@@ -7944,7 +8477,7 @@
                           </m:e>
                           <m:sup>
                             <m:r>
-                              <a:rPr lang="en-US" sz="2600" b="0" i="1" smtClean="0">
+                              <a:rPr lang="en-US" b="0" i="1" smtClean="0">
                                 <a:solidFill>
                                   <a:schemeClr val="tx1"/>
                                 </a:solidFill>
@@ -7959,7 +8492,7 @@
                       </m:num>
                       <m:den>
                         <m:r>
-                          <a:rPr lang="en-US" sz="2600" b="0" i="1" smtClean="0">
+                          <a:rPr lang="en-US" b="0" i="1" smtClean="0">
                             <a:solidFill>
                               <a:schemeClr val="tx1"/>
                             </a:solidFill>
@@ -7972,7 +8505,7 @@
                         <m:sSup>
                           <m:sSupPr>
                             <m:ctrlPr>
-                              <a:rPr lang="en-US" sz="2600" b="0" i="1" smtClean="0">
+                              <a:rPr lang="en-US" b="0" i="1" smtClean="0">
                                 <a:solidFill>
                                   <a:schemeClr val="tx1"/>
                                 </a:solidFill>
@@ -7984,7 +8517,7 @@
                           </m:sSupPr>
                           <m:e>
                             <m:r>
-                              <a:rPr lang="en-US" sz="2600" b="0" i="1" smtClean="0">
+                              <a:rPr lang="en-US" b="0" i="1" smtClean="0">
                                 <a:solidFill>
                                   <a:schemeClr val="tx1"/>
                                 </a:solidFill>
@@ -7997,7 +8530,7 @@
                           </m:e>
                           <m:sup>
                             <m:r>
-                              <a:rPr lang="en-US" sz="2600" b="0" i="1" smtClean="0">
+                              <a:rPr lang="en-US" b="0" i="1" smtClean="0">
                                 <a:solidFill>
                                   <a:schemeClr val="tx1"/>
                                 </a:solidFill>
@@ -8012,7 +8545,7 @@
                       </m:den>
                     </m:f>
                     <m:r>
-                      <a:rPr lang="en-US" sz="2600" b="0" i="1" smtClean="0">
+                      <a:rPr lang="en-US" b="0" i="1" smtClean="0">
                         <a:solidFill>
                           <a:schemeClr val="tx1"/>
                         </a:solidFill>
@@ -8025,7 +8558,7 @@
                   </m:oMath>
                 </a14:m>
                 <a:r>
-                  <a:rPr lang="es-CO" sz="2400" dirty="0">
+                  <a:rPr lang="es-CO" dirty="0">
                     <a:solidFill>
                       <a:schemeClr val="tx1"/>
                     </a:solidFill>
@@ -8102,7 +8635,7 @@
               <a:blipFill>
                 <a:blip r:embed="rId2"/>
                 <a:stretch>
-                  <a:fillRect l="-494"/>
+                  <a:fillRect l="-185" t="-561"/>
                 </a:stretch>
               </a:blipFill>
             </p:spPr>
@@ -8512,6 +9045,99 @@
       </p:grpSpPr>
       <p:sp>
         <p:nvSpPr>
+          <p:cNvPr id="2" name="Title 1">
+            <a:extLst>
+              <a:ext uri="{FF2B5EF4-FFF2-40B4-BE49-F238E27FC236}">
+                <a16:creationId xmlns:a16="http://schemas.microsoft.com/office/drawing/2014/main" id="{F2AFE6F8-2A65-4DEC-BFEE-AF5682477B54}"/>
+              </a:ext>
+            </a:extLst>
+          </p:cNvPr>
+          <p:cNvSpPr>
+            <a:spLocks noGrp="1"/>
+          </p:cNvSpPr>
+          <p:nvPr>
+            <p:ph type="title"/>
+          </p:nvPr>
+        </p:nvSpPr>
+        <p:spPr/>
+        <p:txBody>
+          <a:bodyPr/>
+          <a:lstStyle/>
+          <a:p>
+            <a:r>
+              <a:rPr lang="en-US" dirty="0"/>
+              <a:t>Marco </a:t>
+            </a:r>
+            <a:r>
+              <a:rPr lang="en-US" dirty="0" err="1"/>
+              <a:t>teórico</a:t>
+            </a:r>
+            <a:endParaRPr lang="es-CO" dirty="0"/>
+          </a:p>
+        </p:txBody>
+      </p:sp>
+      <p:pic>
+        <p:nvPicPr>
+          <p:cNvPr id="5" name="Picture 4">
+            <a:extLst>
+              <a:ext uri="{FF2B5EF4-FFF2-40B4-BE49-F238E27FC236}">
+                <a16:creationId xmlns:a16="http://schemas.microsoft.com/office/drawing/2014/main" id="{7DA28D64-667D-4909-9B56-2D204645D0F0}"/>
+              </a:ext>
+            </a:extLst>
+          </p:cNvPr>
+          <p:cNvPicPr>
+            <a:picLocks noChangeAspect="1"/>
+          </p:cNvPicPr>
+          <p:nvPr/>
+        </p:nvPicPr>
+        <p:blipFill>
+          <a:blip r:embed="rId2"/>
+          <a:stretch>
+            <a:fillRect/>
+          </a:stretch>
+        </p:blipFill>
+        <p:spPr>
+          <a:xfrm>
+            <a:off x="2706290" y="1505583"/>
+            <a:ext cx="5915025" cy="4972050"/>
+          </a:xfrm>
+          <a:prstGeom prst="rect">
+            <a:avLst/>
+          </a:prstGeom>
+        </p:spPr>
+      </p:pic>
+    </p:spTree>
+    <p:extLst>
+      <p:ext uri="{BB962C8B-B14F-4D97-AF65-F5344CB8AC3E}">
+        <p14:creationId xmlns:p14="http://schemas.microsoft.com/office/powerpoint/2010/main" val="1455214247"/>
+      </p:ext>
+    </p:extLst>
+  </p:cSld>
+  <p:clrMapOvr>
+    <a:masterClrMapping/>
+  </p:clrMapOvr>
+</p:sld>
+</file>
+
+<file path=ppt/slides/slide7.xml><?xml version="1.0" encoding="utf-8"?>
+<p:sld xmlns:a="http://schemas.openxmlformats.org/drawingml/2006/main" xmlns:r="http://schemas.openxmlformats.org/officeDocument/2006/relationships" xmlns:p="http://schemas.openxmlformats.org/presentationml/2006/main">
+  <p:cSld>
+    <p:spTree>
+      <p:nvGrpSpPr>
+        <p:cNvPr id="1" name=""/>
+        <p:cNvGrpSpPr/>
+        <p:nvPr/>
+      </p:nvGrpSpPr>
+      <p:grpSpPr>
+        <a:xfrm>
+          <a:off x="0" y="0"/>
+          <a:ext cx="0" cy="0"/>
+          <a:chOff x="0" y="0"/>
+          <a:chExt cx="0" cy="0"/>
+        </a:xfrm>
+      </p:grpSpPr>
+      <p:sp>
+        <p:nvSpPr>
           <p:cNvPr id="2" name="Title 1"/>
           <p:cNvSpPr>
             <a:spLocks noGrp="1"/>
@@ -8526,8 +9152,12 @@
           <a:lstStyle/>
           <a:p>
             <a:r>
+              <a:rPr lang="en-US" dirty="0"/>
+              <a:t>Marco </a:t>
+            </a:r>
+            <a:r>
               <a:rPr lang="en-US" dirty="0" err="1"/>
-              <a:t>Teoría</a:t>
+              <a:t>teórico</a:t>
             </a:r>
             <a:endParaRPr lang="es-CO" dirty="0"/>
           </a:p>
@@ -8553,7 +9183,7 @@
             </p:spPr>
             <p:txBody>
               <a:bodyPr>
-                <a:normAutofit lnSpcReduction="10000"/>
+                <a:normAutofit/>
               </a:bodyPr>
               <a:lstStyle/>
               <a:p>
@@ -8561,7 +9191,7 @@
                   <a:buNone/>
                 </a:pPr>
                 <a:r>
-                  <a:rPr lang="en-US" sz="2000" dirty="0">
+                  <a:rPr lang="en-US" sz="1800" dirty="0">
                     <a:solidFill>
                       <a:schemeClr val="tx1"/>
                     </a:solidFill>
@@ -8571,7 +9201,7 @@
                   <a:t>Lattice </a:t>
                 </a:r>
                 <a:r>
-                  <a:rPr lang="es-CO" sz="2000" dirty="0" err="1">
+                  <a:rPr lang="es-CO" sz="1800" dirty="0" err="1">
                     <a:solidFill>
                       <a:schemeClr val="tx1"/>
                     </a:solidFill>
@@ -8581,7 +9211,7 @@
                   <a:t>Boltzmann</a:t>
                 </a:r>
                 <a:r>
-                  <a:rPr lang="es-CO" sz="2000" dirty="0">
+                  <a:rPr lang="es-CO" sz="1800" dirty="0">
                     <a:solidFill>
                       <a:schemeClr val="tx1"/>
                     </a:solidFill>
@@ -8591,7 +9221,7 @@
                   <a:t> de múltiples tiempos de </a:t>
                 </a:r>
                 <a:r>
-                  <a:rPr lang="es-CO" sz="2000" dirty="0" err="1">
+                  <a:rPr lang="es-CO" sz="1800" dirty="0" err="1">
                     <a:solidFill>
                       <a:schemeClr val="tx1"/>
                     </a:solidFill>
@@ -8601,7 +9231,7 @@
                   <a:t>relajaci</a:t>
                 </a:r>
                 <a:r>
-                  <a:rPr lang="en-US" sz="2000" dirty="0" err="1">
+                  <a:rPr lang="en-US" sz="1800" dirty="0" err="1">
                     <a:solidFill>
                       <a:schemeClr val="tx1"/>
                     </a:solidFill>
@@ -8611,7 +9241,7 @@
                   <a:t>ón</a:t>
                 </a:r>
                 <a:r>
-                  <a:rPr lang="en-US" sz="2000" dirty="0">
+                  <a:rPr lang="en-US" sz="1800" dirty="0">
                     <a:solidFill>
                       <a:schemeClr val="tx1"/>
                     </a:solidFill>
@@ -8620,7 +9250,7 @@
                   </a:rPr>
                   <a:t>: </a:t>
                 </a:r>
-                <a:endParaRPr lang="es-CO" sz="2000" dirty="0">
+                <a:endParaRPr lang="es-CO" sz="1800" dirty="0">
                   <a:solidFill>
                     <a:schemeClr val="tx1"/>
                   </a:solidFill>
@@ -8633,7 +9263,7 @@
                   <a:buNone/>
                 </a:pPr>
                 <a:r>
-                  <a:rPr lang="en-US" sz="2000" dirty="0" err="1">
+                  <a:rPr lang="en-US" sz="1800" dirty="0" err="1">
                     <a:solidFill>
                       <a:schemeClr val="tx1"/>
                     </a:solidFill>
@@ -8643,7 +9273,7 @@
                   <a:t>Momentos</a:t>
                 </a:r>
                 <a:r>
-                  <a:rPr lang="en-US" sz="2000" dirty="0">
+                  <a:rPr lang="en-US" sz="1800" dirty="0">
                     <a:solidFill>
                       <a:schemeClr val="tx1"/>
                     </a:solidFill>
@@ -8653,7 +9283,7 @@
                   <a:t>:</a:t>
                 </a:r>
                 <a:br>
-                  <a:rPr lang="en-US" sz="2000" dirty="0">
+                  <a:rPr lang="en-US" sz="1800" dirty="0">
                     <a:solidFill>
                       <a:schemeClr val="tx1"/>
                     </a:solidFill>
@@ -9534,7 +10164,7 @@
               <a:blipFill>
                 <a:blip r:embed="rId2"/>
                 <a:stretch>
-                  <a:fillRect l="-271" t="-2104"/>
+                  <a:fillRect l="-90" t="-1403" b="-842"/>
                 </a:stretch>
               </a:blipFill>
             </p:spPr>
@@ -10879,7 +11509,7 @@
 </p:sld>
 </file>
 
-<file path=ppt/slides/slide7.xml><?xml version="1.0" encoding="utf-8"?>
+<file path=ppt/slides/slide8.xml><?xml version="1.0" encoding="utf-8"?>
 <p:sld xmlns:a="http://schemas.openxmlformats.org/drawingml/2006/main" xmlns:r="http://schemas.openxmlformats.org/officeDocument/2006/relationships" xmlns:p="http://schemas.openxmlformats.org/presentationml/2006/main">
   <p:cSld>
     <p:spTree>
@@ -10912,8 +11542,8 @@
           <a:lstStyle/>
           <a:p>
             <a:r>
-              <a:rPr lang="en-US" dirty="0" err="1"/>
-              <a:t>Teoría</a:t>
+              <a:rPr lang="en-US"/>
+              <a:t>Marco teórico</a:t>
             </a:r>
             <a:endParaRPr lang="es-CO" dirty="0"/>
           </a:p>
@@ -10957,7 +11587,7 @@
                   <a:t>Pasos </a:t>
                 </a:r>
                 <a:r>
-                  <a:rPr lang="en-US" sz="1800" dirty="0">
+                  <a:rPr lang="en-US" sz="1600" dirty="0">
                     <a:solidFill>
                       <a:schemeClr val="tx1"/>
                     </a:solidFill>
@@ -12268,7 +12898,7 @@
                     <a:ea typeface="Cambria Math" panose="02040503050406030204" pitchFamily="18" charset="0"/>
                     <a:cs typeface="Calibri Light" panose="020F0302020204030204" pitchFamily="34" charset="0"/>
                   </a:rPr>
-                  <a:t>                </a:t>
+                  <a:t>                 </a:t>
                 </a:r>
                 <a14:m>
                   <m:oMath xmlns:m="http://schemas.openxmlformats.org/officeDocument/2006/math">
@@ -12845,7 +13475,7 @@
                     <a:ea typeface="Cambria Math" panose="02040503050406030204" pitchFamily="18" charset="0"/>
                     <a:cs typeface="Calibri Light" panose="020F0302020204030204" pitchFamily="34" charset="0"/>
                   </a:rPr>
-                  <a:t>                 </a:t>
+                  <a:t>                  </a:t>
                 </a:r>
                 <a14:m>
                   <m:oMath xmlns:m="http://schemas.openxmlformats.org/officeDocument/2006/math">
@@ -14655,7 +15285,7 @@
               <a:blipFill>
                 <a:blip r:embed="rId2"/>
                 <a:stretch>
-                  <a:fillRect t="-1543" b="-13885"/>
+                  <a:fillRect t="-1262" b="-13324"/>
                 </a:stretch>
               </a:blipFill>
             </p:spPr>
@@ -15375,99 +16005,6 @@
 </p:sld>
 </file>
 
-<file path=ppt/slides/slide8.xml><?xml version="1.0" encoding="utf-8"?>
-<p:sld xmlns:a="http://schemas.openxmlformats.org/drawingml/2006/main" xmlns:r="http://schemas.openxmlformats.org/officeDocument/2006/relationships" xmlns:p="http://schemas.openxmlformats.org/presentationml/2006/main">
-  <p:cSld>
-    <p:spTree>
-      <p:nvGrpSpPr>
-        <p:cNvPr id="1" name=""/>
-        <p:cNvGrpSpPr/>
-        <p:nvPr/>
-      </p:nvGrpSpPr>
-      <p:grpSpPr>
-        <a:xfrm>
-          <a:off x="0" y="0"/>
-          <a:ext cx="0" cy="0"/>
-          <a:chOff x="0" y="0"/>
-          <a:chExt cx="0" cy="0"/>
-        </a:xfrm>
-      </p:grpSpPr>
-      <p:sp>
-        <p:nvSpPr>
-          <p:cNvPr id="2" name="Title 1">
-            <a:extLst>
-              <a:ext uri="{FF2B5EF4-FFF2-40B4-BE49-F238E27FC236}">
-                <a16:creationId xmlns:a16="http://schemas.microsoft.com/office/drawing/2014/main" id="{F2AFE6F8-2A65-4DEC-BFEE-AF5682477B54}"/>
-              </a:ext>
-            </a:extLst>
-          </p:cNvPr>
-          <p:cNvSpPr>
-            <a:spLocks noGrp="1"/>
-          </p:cNvSpPr>
-          <p:nvPr>
-            <p:ph type="title"/>
-          </p:nvPr>
-        </p:nvSpPr>
-        <p:spPr/>
-        <p:txBody>
-          <a:bodyPr/>
-          <a:lstStyle/>
-          <a:p>
-            <a:r>
-              <a:rPr lang="en-US" dirty="0" err="1"/>
-              <a:t>Teor</a:t>
-            </a:r>
-            <a:r>
-              <a:rPr lang="es-CO" dirty="0" err="1"/>
-              <a:t>ía</a:t>
-            </a:r>
-            <a:endParaRPr lang="es-CO" dirty="0"/>
-          </a:p>
-        </p:txBody>
-      </p:sp>
-      <p:pic>
-        <p:nvPicPr>
-          <p:cNvPr id="5" name="Picture 4">
-            <a:extLst>
-              <a:ext uri="{FF2B5EF4-FFF2-40B4-BE49-F238E27FC236}">
-                <a16:creationId xmlns:a16="http://schemas.microsoft.com/office/drawing/2014/main" id="{7DA28D64-667D-4909-9B56-2D204645D0F0}"/>
-              </a:ext>
-            </a:extLst>
-          </p:cNvPr>
-          <p:cNvPicPr>
-            <a:picLocks noChangeAspect="1"/>
-          </p:cNvPicPr>
-          <p:nvPr/>
-        </p:nvPicPr>
-        <p:blipFill>
-          <a:blip r:embed="rId2"/>
-          <a:stretch>
-            <a:fillRect/>
-          </a:stretch>
-        </p:blipFill>
-        <p:spPr>
-          <a:xfrm>
-            <a:off x="2858690" y="1226183"/>
-            <a:ext cx="5915025" cy="4972050"/>
-          </a:xfrm>
-          <a:prstGeom prst="rect">
-            <a:avLst/>
-          </a:prstGeom>
-        </p:spPr>
-      </p:pic>
-    </p:spTree>
-    <p:extLst>
-      <p:ext uri="{BB962C8B-B14F-4D97-AF65-F5344CB8AC3E}">
-        <p14:creationId xmlns:p14="http://schemas.microsoft.com/office/powerpoint/2010/main" val="1455214247"/>
-      </p:ext>
-    </p:extLst>
-  </p:cSld>
-  <p:clrMapOvr>
-    <a:masterClrMapping/>
-  </p:clrMapOvr>
-</p:sld>
-</file>
-
 <file path=ppt/slides/slide9.xml><?xml version="1.0" encoding="utf-8"?>
 <p:sld xmlns:a="http://schemas.openxmlformats.org/drawingml/2006/main" xmlns:r="http://schemas.openxmlformats.org/officeDocument/2006/relationships" xmlns:p="http://schemas.openxmlformats.org/presentationml/2006/main">
   <p:cSld>
@@ -15502,7 +16039,7 @@
           <a:p>
             <a:r>
               <a:rPr lang="en-US" dirty="0" err="1"/>
-              <a:t>Código</a:t>
+              <a:t>Implementación</a:t>
             </a:r>
             <a:endParaRPr lang="es-CO" dirty="0"/>
           </a:p>
@@ -15532,6 +16069,9 @@
               </a:bodyPr>
               <a:lstStyle/>
               <a:p>
+                <a:pPr marL="45720" indent="0">
+                  <a:buNone/>
+                </a:pPr>
                 <a:r>
                   <a:rPr lang="en-US" dirty="0">
                     <a:solidFill>
@@ -16482,7 +17022,7 @@
               <a:blipFill>
                 <a:blip r:embed="rId2"/>
                 <a:stretch>
-                  <a:fillRect t="-1964" r="-185"/>
+                  <a:fillRect l="-309" t="-1964"/>
                 </a:stretch>
               </a:blipFill>
             </p:spPr>

</xml_diff>